<commit_message>
Slides from 5 to 10 uploaded
</commit_message>
<xml_diff>
--- a/ProjectPhases/Project-Phase-03-CS310-F-171.pptx
+++ b/ProjectPhases/Project-Phase-03-CS310-F-171.pptx
@@ -5,11 +5,16 @@
     <p:sldMasterId id="2147484172" r:id="rId1"/>
   </p:sldMasterIdLst>
   <p:sldIdLst>
-    <p:sldId id="256" r:id="rId2"/>
+    <p:sldId id="261" r:id="rId2"/>
     <p:sldId id="257" r:id="rId3"/>
     <p:sldId id="258" r:id="rId4"/>
     <p:sldId id="259" r:id="rId5"/>
     <p:sldId id="260" r:id="rId6"/>
+    <p:sldId id="262" r:id="rId7"/>
+    <p:sldId id="263" r:id="rId8"/>
+    <p:sldId id="264" r:id="rId9"/>
+    <p:sldId id="266" r:id="rId10"/>
+    <p:sldId id="265" r:id="rId11"/>
   </p:sldIdLst>
   <p:sldSz cx="12192000" cy="6858000"/>
   <p:notesSz cx="6858000" cy="9144000"/>
@@ -119,7 +124,7 @@
 <file path=ppt/revisionInfo.xml><?xml version="1.0" encoding="utf-8"?>
 <p1510:revInfo xmlns:a="http://schemas.openxmlformats.org/drawingml/2006/main" xmlns:r="http://schemas.openxmlformats.org/officeDocument/2006/relationships" xmlns:p1510="http://schemas.microsoft.com/office/powerpoint/2015/10/main">
   <p1510:revLst>
-    <p1510:client id="{ADA99D81-B028-4AD4-ABAA-0E952828D3D8}" v="38" dt="2020-04-15T05:30:50.237"/>
+    <p1510:client id="{ADA99D81-B028-4AD4-ABAA-0E952828D3D8}" v="76" dt="2020-04-16T13:21:21.342"/>
   </p1510:revLst>
 </p1510:revInfo>
 </file>
@@ -128,8 +133,8 @@
 <pc:chgInfo xmlns:a="http://schemas.openxmlformats.org/drawingml/2006/main" xmlns:r="http://schemas.openxmlformats.org/officeDocument/2006/relationships" xmlns:ac="http://schemas.microsoft.com/office/drawing/2013/main/command" xmlns:pc="http://schemas.microsoft.com/office/powerpoint/2013/main/command">
   <pc:docChgLst>
     <pc:chgData name="abdulilah.q@outlook.com" userId="e558258b1f0d0369" providerId="LiveId" clId="{ADA99D81-B028-4AD4-ABAA-0E952828D3D8}"/>
-    <pc:docChg chg="undo custSel mod modSld addMainMaster delMainMaster">
-      <pc:chgData name="abdulilah.q@outlook.com" userId="e558258b1f0d0369" providerId="LiveId" clId="{ADA99D81-B028-4AD4-ABAA-0E952828D3D8}" dt="2020-04-15T05:30:42.337" v="27" actId="478"/>
+    <pc:docChg chg="undo custSel mod addSld modSld addMainMaster delMainMaster">
+      <pc:chgData name="abdulilah.q@outlook.com" userId="e558258b1f0d0369" providerId="LiveId" clId="{ADA99D81-B028-4AD4-ABAA-0E952828D3D8}" dt="2020-04-16T13:21:21.342" v="1464" actId="11529"/>
       <pc:docMkLst>
         <pc:docMk/>
       </pc:docMkLst>
@@ -443,6 +448,282 @@
             <ac:cxnSpMk id="45" creationId="{B9EB6DAA-2F0C-43D5-A577-15D5D2C4E3F5}"/>
           </ac:cxnSpMkLst>
         </pc:cxnChg>
+      </pc:sldChg>
+      <pc:sldChg chg="modSp">
+        <pc:chgData name="abdulilah.q@outlook.com" userId="e558258b1f0d0369" providerId="LiveId" clId="{ADA99D81-B028-4AD4-ABAA-0E952828D3D8}" dt="2020-04-16T11:19:59.912" v="131" actId="20577"/>
+        <pc:sldMkLst>
+          <pc:docMk/>
+          <pc:sldMk cId="1668517224" sldId="257"/>
+        </pc:sldMkLst>
+        <pc:spChg chg="mod">
+          <ac:chgData name="abdulilah.q@outlook.com" userId="e558258b1f0d0369" providerId="LiveId" clId="{ADA99D81-B028-4AD4-ABAA-0E952828D3D8}" dt="2020-04-16T11:19:59.912" v="131" actId="20577"/>
+          <ac:spMkLst>
+            <pc:docMk/>
+            <pc:sldMk cId="1668517224" sldId="257"/>
+            <ac:spMk id="44" creationId="{4304125B-C657-4FD1-93BA-AA0B94A16FFA}"/>
+          </ac:spMkLst>
+        </pc:spChg>
+      </pc:sldChg>
+      <pc:sldChg chg="addSp delSp modSp">
+        <pc:chgData name="abdulilah.q@outlook.com" userId="e558258b1f0d0369" providerId="LiveId" clId="{ADA99D81-B028-4AD4-ABAA-0E952828D3D8}" dt="2020-04-16T11:19:18.232" v="121" actId="1076"/>
+        <pc:sldMkLst>
+          <pc:docMk/>
+          <pc:sldMk cId="1673448457" sldId="261"/>
+        </pc:sldMkLst>
+        <pc:spChg chg="add del">
+          <ac:chgData name="abdulilah.q@outlook.com" userId="e558258b1f0d0369" providerId="LiveId" clId="{ADA99D81-B028-4AD4-ABAA-0E952828D3D8}" dt="2020-04-16T11:13:09.755" v="30" actId="11529"/>
+          <ac:spMkLst>
+            <pc:docMk/>
+            <pc:sldMk cId="1673448457" sldId="261"/>
+            <ac:spMk id="4" creationId="{6A424C15-4248-4806-9A57-7395C0863DDD}"/>
+          </ac:spMkLst>
+        </pc:spChg>
+        <pc:spChg chg="add mod">
+          <ac:chgData name="abdulilah.q@outlook.com" userId="e558258b1f0d0369" providerId="LiveId" clId="{ADA99D81-B028-4AD4-ABAA-0E952828D3D8}" dt="2020-04-16T11:19:18.232" v="121" actId="1076"/>
+          <ac:spMkLst>
+            <pc:docMk/>
+            <pc:sldMk cId="1673448457" sldId="261"/>
+            <ac:spMk id="6" creationId="{7C80DD5C-5E1B-4E4D-B4D4-F5CC3BB37D8E}"/>
+          </ac:spMkLst>
+        </pc:spChg>
+        <pc:picChg chg="mod">
+          <ac:chgData name="abdulilah.q@outlook.com" userId="e558258b1f0d0369" providerId="LiveId" clId="{ADA99D81-B028-4AD4-ABAA-0E952828D3D8}" dt="2020-04-16T11:11:18.424" v="28" actId="1076"/>
+          <ac:picMkLst>
+            <pc:docMk/>
+            <pc:sldMk cId="1673448457" sldId="261"/>
+            <ac:picMk id="5" creationId="{F86CF7A2-6757-4FE3-9717-003D9BF7A78A}"/>
+          </ac:picMkLst>
+        </pc:picChg>
+      </pc:sldChg>
+      <pc:sldChg chg="addSp delSp modSp new">
+        <pc:chgData name="abdulilah.q@outlook.com" userId="e558258b1f0d0369" providerId="LiveId" clId="{ADA99D81-B028-4AD4-ABAA-0E952828D3D8}" dt="2020-04-16T13:15:59.116" v="1360" actId="1076"/>
+        <pc:sldMkLst>
+          <pc:docMk/>
+          <pc:sldMk cId="3900144499" sldId="262"/>
+        </pc:sldMkLst>
+        <pc:spChg chg="add mod">
+          <ac:chgData name="abdulilah.q@outlook.com" userId="e558258b1f0d0369" providerId="LiveId" clId="{ADA99D81-B028-4AD4-ABAA-0E952828D3D8}" dt="2020-04-16T12:08:58.092" v="424" actId="20577"/>
+          <ac:spMkLst>
+            <pc:docMk/>
+            <pc:sldMk cId="3900144499" sldId="262"/>
+            <ac:spMk id="2" creationId="{58BDDBD7-7E73-446D-9A03-376A9F9D1AF1}"/>
+          </ac:spMkLst>
+        </pc:spChg>
+        <pc:spChg chg="add del mod">
+          <ac:chgData name="abdulilah.q@outlook.com" userId="e558258b1f0d0369" providerId="LiveId" clId="{ADA99D81-B028-4AD4-ABAA-0E952828D3D8}" dt="2020-04-16T12:04:28.990" v="227" actId="478"/>
+          <ac:spMkLst>
+            <pc:docMk/>
+            <pc:sldMk cId="3900144499" sldId="262"/>
+            <ac:spMk id="3" creationId="{67F88E37-0435-4063-81EB-EE64D9E5644E}"/>
+          </ac:spMkLst>
+        </pc:spChg>
+        <pc:spChg chg="add mod">
+          <ac:chgData name="abdulilah.q@outlook.com" userId="e558258b1f0d0369" providerId="LiveId" clId="{ADA99D81-B028-4AD4-ABAA-0E952828D3D8}" dt="2020-04-16T12:07:14.947" v="415" actId="207"/>
+          <ac:spMkLst>
+            <pc:docMk/>
+            <pc:sldMk cId="3900144499" sldId="262"/>
+            <ac:spMk id="8" creationId="{FC7DDFC1-775D-4591-B258-C15FF8CD6E2E}"/>
+          </ac:spMkLst>
+        </pc:spChg>
+        <pc:spChg chg="add mod">
+          <ac:chgData name="abdulilah.q@outlook.com" userId="e558258b1f0d0369" providerId="LiveId" clId="{ADA99D81-B028-4AD4-ABAA-0E952828D3D8}" dt="2020-04-16T12:09:53.217" v="451" actId="1076"/>
+          <ac:spMkLst>
+            <pc:docMk/>
+            <pc:sldMk cId="3900144499" sldId="262"/>
+            <ac:spMk id="9" creationId="{623C0E39-3E17-423C-ADA6-4158DB7E4033}"/>
+          </ac:spMkLst>
+        </pc:spChg>
+        <pc:spChg chg="add del">
+          <ac:chgData name="abdulilah.q@outlook.com" userId="e558258b1f0d0369" providerId="LiveId" clId="{ADA99D81-B028-4AD4-ABAA-0E952828D3D8}" dt="2020-04-16T12:23:14.352" v="563" actId="478"/>
+          <ac:spMkLst>
+            <pc:docMk/>
+            <pc:sldMk cId="3900144499" sldId="262"/>
+            <ac:spMk id="26" creationId="{289446A3-FF4E-47FE-9F89-8BD1136189E5}"/>
+          </ac:spMkLst>
+        </pc:spChg>
+        <pc:spChg chg="add del mod">
+          <ac:chgData name="abdulilah.q@outlook.com" userId="e558258b1f0d0369" providerId="LiveId" clId="{ADA99D81-B028-4AD4-ABAA-0E952828D3D8}" dt="2020-04-16T12:25:05.137" v="582" actId="478"/>
+          <ac:spMkLst>
+            <pc:docMk/>
+            <pc:sldMk cId="3900144499" sldId="262"/>
+            <ac:spMk id="27" creationId="{0B326AE1-CE8D-4A9A-A0BC-9C491E7A9661}"/>
+          </ac:spMkLst>
+        </pc:spChg>
+        <pc:spChg chg="add mod">
+          <ac:chgData name="abdulilah.q@outlook.com" userId="e558258b1f0d0369" providerId="LiveId" clId="{ADA99D81-B028-4AD4-ABAA-0E952828D3D8}" dt="2020-04-16T13:15:30.155" v="1357" actId="1076"/>
+          <ac:spMkLst>
+            <pc:docMk/>
+            <pc:sldMk cId="3900144499" sldId="262"/>
+            <ac:spMk id="28" creationId="{9329A980-9EFB-4929-8C2D-0505471C3A07}"/>
+          </ac:spMkLst>
+        </pc:spChg>
+        <pc:spChg chg="add del mod">
+          <ac:chgData name="abdulilah.q@outlook.com" userId="e558258b1f0d0369" providerId="LiveId" clId="{ADA99D81-B028-4AD4-ABAA-0E952828D3D8}" dt="2020-04-16T12:28:49.170" v="779" actId="767"/>
+          <ac:spMkLst>
+            <pc:docMk/>
+            <pc:sldMk cId="3900144499" sldId="262"/>
+            <ac:spMk id="29" creationId="{CEF3D891-D5DD-417E-A3C3-D047EF70ADF3}"/>
+          </ac:spMkLst>
+        </pc:spChg>
+        <pc:spChg chg="add mod">
+          <ac:chgData name="abdulilah.q@outlook.com" userId="e558258b1f0d0369" providerId="LiveId" clId="{ADA99D81-B028-4AD4-ABAA-0E952828D3D8}" dt="2020-04-16T13:14:57.314" v="1354" actId="404"/>
+          <ac:spMkLst>
+            <pc:docMk/>
+            <pc:sldMk cId="3900144499" sldId="262"/>
+            <ac:spMk id="30" creationId="{21767AF9-1F20-4443-B644-450F466CF0DA}"/>
+          </ac:spMkLst>
+        </pc:spChg>
+        <pc:spChg chg="add del mod">
+          <ac:chgData name="abdulilah.q@outlook.com" userId="e558258b1f0d0369" providerId="LiveId" clId="{ADA99D81-B028-4AD4-ABAA-0E952828D3D8}" dt="2020-04-16T12:34:05.231" v="934"/>
+          <ac:spMkLst>
+            <pc:docMk/>
+            <pc:sldMk cId="3900144499" sldId="262"/>
+            <ac:spMk id="31" creationId="{47DF4C16-8A7F-4D8B-91FF-B9F0DD445C4F}"/>
+          </ac:spMkLst>
+        </pc:spChg>
+        <pc:spChg chg="add mod">
+          <ac:chgData name="abdulilah.q@outlook.com" userId="e558258b1f0d0369" providerId="LiveId" clId="{ADA99D81-B028-4AD4-ABAA-0E952828D3D8}" dt="2020-04-16T13:15:20.195" v="1356" actId="1076"/>
+          <ac:spMkLst>
+            <pc:docMk/>
+            <pc:sldMk cId="3900144499" sldId="262"/>
+            <ac:spMk id="32" creationId="{61ECC447-A050-4E95-BA50-A8AA8A354A6A}"/>
+          </ac:spMkLst>
+        </pc:spChg>
+        <pc:picChg chg="add mod ord">
+          <ac:chgData name="abdulilah.q@outlook.com" userId="e558258b1f0d0369" providerId="LiveId" clId="{ADA99D81-B028-4AD4-ABAA-0E952828D3D8}" dt="2020-04-16T12:10:02.930" v="453" actId="14100"/>
+          <ac:picMkLst>
+            <pc:docMk/>
+            <pc:sldMk cId="3900144499" sldId="262"/>
+            <ac:picMk id="5" creationId="{93A2A2FB-3A2B-4895-9496-9DFAA1C23066}"/>
+          </ac:picMkLst>
+        </pc:picChg>
+        <pc:picChg chg="add mod ord">
+          <ac:chgData name="abdulilah.q@outlook.com" userId="e558258b1f0d0369" providerId="LiveId" clId="{ADA99D81-B028-4AD4-ABAA-0E952828D3D8}" dt="2020-04-16T12:35:03.489" v="998" actId="29295"/>
+          <ac:picMkLst>
+            <pc:docMk/>
+            <pc:sldMk cId="3900144499" sldId="262"/>
+            <ac:picMk id="7" creationId="{D2923564-474A-4A0C-81F2-91ABA7C41B09}"/>
+          </ac:picMkLst>
+        </pc:picChg>
+        <pc:picChg chg="add del mod">
+          <ac:chgData name="abdulilah.q@outlook.com" userId="e558258b1f0d0369" providerId="LiveId" clId="{ADA99D81-B028-4AD4-ABAA-0E952828D3D8}" dt="2020-04-16T12:11:32.910" v="460" actId="478"/>
+          <ac:picMkLst>
+            <pc:docMk/>
+            <pc:sldMk cId="3900144499" sldId="262"/>
+            <ac:picMk id="11" creationId="{2E4E5451-A2DF-45DA-B6F2-3E20328A6180}"/>
+          </ac:picMkLst>
+        </pc:picChg>
+        <pc:picChg chg="add del mod">
+          <ac:chgData name="abdulilah.q@outlook.com" userId="e558258b1f0d0369" providerId="LiveId" clId="{ADA99D81-B028-4AD4-ABAA-0E952828D3D8}" dt="2020-04-16T12:17:05.413" v="499" actId="478"/>
+          <ac:picMkLst>
+            <pc:docMk/>
+            <pc:sldMk cId="3900144499" sldId="262"/>
+            <ac:picMk id="13" creationId="{2C432328-DCF4-4FB3-A283-0A1EF99ADD75}"/>
+          </ac:picMkLst>
+        </pc:picChg>
+        <pc:picChg chg="add del mod">
+          <ac:chgData name="abdulilah.q@outlook.com" userId="e558258b1f0d0369" providerId="LiveId" clId="{ADA99D81-B028-4AD4-ABAA-0E952828D3D8}" dt="2020-04-16T12:20:26.347" v="535" actId="478"/>
+          <ac:picMkLst>
+            <pc:docMk/>
+            <pc:sldMk cId="3900144499" sldId="262"/>
+            <ac:picMk id="15" creationId="{3FD54DED-F607-4B36-86B0-935F4E54EAD8}"/>
+          </ac:picMkLst>
+        </pc:picChg>
+        <pc:picChg chg="add del mod">
+          <ac:chgData name="abdulilah.q@outlook.com" userId="e558258b1f0d0369" providerId="LiveId" clId="{ADA99D81-B028-4AD4-ABAA-0E952828D3D8}" dt="2020-04-16T12:20:24.224" v="534" actId="478"/>
+          <ac:picMkLst>
+            <pc:docMk/>
+            <pc:sldMk cId="3900144499" sldId="262"/>
+            <ac:picMk id="17" creationId="{87B7136D-1896-4ADB-AACD-11AA9B6301F3}"/>
+          </ac:picMkLst>
+        </pc:picChg>
+        <pc:picChg chg="add del mod">
+          <ac:chgData name="abdulilah.q@outlook.com" userId="e558258b1f0d0369" providerId="LiveId" clId="{ADA99D81-B028-4AD4-ABAA-0E952828D3D8}" dt="2020-04-16T12:20:13.075" v="532" actId="478"/>
+          <ac:picMkLst>
+            <pc:docMk/>
+            <pc:sldMk cId="3900144499" sldId="262"/>
+            <ac:picMk id="19" creationId="{A6CCF722-2EDE-43E2-95B5-8A1D7781A2B2}"/>
+          </ac:picMkLst>
+        </pc:picChg>
+        <pc:picChg chg="add del mod">
+          <ac:chgData name="abdulilah.q@outlook.com" userId="e558258b1f0d0369" providerId="LiveId" clId="{ADA99D81-B028-4AD4-ABAA-0E952828D3D8}" dt="2020-04-16T12:18:23.987" v="510" actId="931"/>
+          <ac:picMkLst>
+            <pc:docMk/>
+            <pc:sldMk cId="3900144499" sldId="262"/>
+            <ac:picMk id="21" creationId="{22CB9BD4-33FB-42A0-9FCD-DF73B434845D}"/>
+          </ac:picMkLst>
+        </pc:picChg>
+        <pc:picChg chg="add mod">
+          <ac:chgData name="abdulilah.q@outlook.com" userId="e558258b1f0d0369" providerId="LiveId" clId="{ADA99D81-B028-4AD4-ABAA-0E952828D3D8}" dt="2020-04-16T13:15:38.481" v="1358" actId="1076"/>
+          <ac:picMkLst>
+            <pc:docMk/>
+            <pc:sldMk cId="3900144499" sldId="262"/>
+            <ac:picMk id="23" creationId="{25C4C365-0E2C-4FD1-B608-B0F2FF49B216}"/>
+          </ac:picMkLst>
+        </pc:picChg>
+        <pc:picChg chg="add mod">
+          <ac:chgData name="abdulilah.q@outlook.com" userId="e558258b1f0d0369" providerId="LiveId" clId="{ADA99D81-B028-4AD4-ABAA-0E952828D3D8}" dt="2020-04-16T13:15:59.116" v="1360" actId="1076"/>
+          <ac:picMkLst>
+            <pc:docMk/>
+            <pc:sldMk cId="3900144499" sldId="262"/>
+            <ac:picMk id="24" creationId="{1F48D38E-322A-41B8-AB60-C84E79C2B037}"/>
+          </ac:picMkLst>
+        </pc:picChg>
+        <pc:picChg chg="add mod">
+          <ac:chgData name="abdulilah.q@outlook.com" userId="e558258b1f0d0369" providerId="LiveId" clId="{ADA99D81-B028-4AD4-ABAA-0E952828D3D8}" dt="2020-04-16T13:15:48.691" v="1359" actId="1076"/>
+          <ac:picMkLst>
+            <pc:docMk/>
+            <pc:sldMk cId="3900144499" sldId="262"/>
+            <ac:picMk id="25" creationId="{AD715580-608F-4A1F-94A3-792C51B61B66}"/>
+          </ac:picMkLst>
+        </pc:picChg>
+      </pc:sldChg>
+      <pc:sldChg chg="addSp delSp modSp new mod setBg">
+        <pc:chgData name="abdulilah.q@outlook.com" userId="e558258b1f0d0369" providerId="LiveId" clId="{ADA99D81-B028-4AD4-ABAA-0E952828D3D8}" dt="2020-04-16T13:21:21.342" v="1464" actId="11529"/>
+        <pc:sldMkLst>
+          <pc:docMk/>
+          <pc:sldMk cId="3609006249" sldId="263"/>
+        </pc:sldMkLst>
+        <pc:spChg chg="add mod">
+          <ac:chgData name="abdulilah.q@outlook.com" userId="e558258b1f0d0369" providerId="LiveId" clId="{ADA99D81-B028-4AD4-ABAA-0E952828D3D8}" dt="2020-04-16T13:20:31.549" v="1452" actId="207"/>
+          <ac:spMkLst>
+            <pc:docMk/>
+            <pc:sldMk cId="3609006249" sldId="263"/>
+            <ac:spMk id="4" creationId="{15333259-7A83-4072-95FF-90109D7572AA}"/>
+          </ac:spMkLst>
+        </pc:spChg>
+        <pc:spChg chg="add mod">
+          <ac:chgData name="abdulilah.q@outlook.com" userId="e558258b1f0d0369" providerId="LiveId" clId="{ADA99D81-B028-4AD4-ABAA-0E952828D3D8}" dt="2020-04-16T13:21:21.342" v="1464" actId="11529"/>
+          <ac:spMkLst>
+            <pc:docMk/>
+            <pc:sldMk cId="3609006249" sldId="263"/>
+            <ac:spMk id="5" creationId="{084BB3F7-F0D1-4B10-B692-DE8DB50FEC26}"/>
+          </ac:spMkLst>
+        </pc:spChg>
+        <pc:spChg chg="add del">
+          <ac:chgData name="abdulilah.q@outlook.com" userId="e558258b1f0d0369" providerId="LiveId" clId="{ADA99D81-B028-4AD4-ABAA-0E952828D3D8}" dt="2020-04-16T13:18:57.414" v="1368" actId="26606"/>
+          <ac:spMkLst>
+            <pc:docMk/>
+            <pc:sldMk cId="3609006249" sldId="263"/>
+            <ac:spMk id="8" creationId="{BCD2D517-BC35-4439-AC31-06DF764F25FC}"/>
+          </ac:spMkLst>
+        </pc:spChg>
+        <pc:spChg chg="add del">
+          <ac:chgData name="abdulilah.q@outlook.com" userId="e558258b1f0d0369" providerId="LiveId" clId="{ADA99D81-B028-4AD4-ABAA-0E952828D3D8}" dt="2020-04-16T13:18:57.414" v="1368" actId="26606"/>
+          <ac:spMkLst>
+            <pc:docMk/>
+            <pc:sldMk cId="3609006249" sldId="263"/>
+            <ac:spMk id="10" creationId="{2DD3F846-0483-40F5-A881-0C1AD2A0CAD7}"/>
+          </ac:spMkLst>
+        </pc:spChg>
+        <pc:picChg chg="add mod ord">
+          <ac:chgData name="abdulilah.q@outlook.com" userId="e558258b1f0d0369" providerId="LiveId" clId="{ADA99D81-B028-4AD4-ABAA-0E952828D3D8}" dt="2020-04-16T13:20:59.032" v="1463" actId="14100"/>
+          <ac:picMkLst>
+            <pc:docMk/>
+            <pc:sldMk cId="3609006249" sldId="263"/>
+            <ac:picMk id="3" creationId="{C366B31A-B0F6-44E2-98DD-52FAF0DE3A27}"/>
+          </ac:picMkLst>
+        </pc:picChg>
       </pc:sldChg>
       <pc:sldMasterChg chg="add del addSldLayout delSldLayout">
         <pc:chgData name="abdulilah.q@outlook.com" userId="e558258b1f0d0369" providerId="LiveId" clId="{ADA99D81-B028-4AD4-ABAA-0E952828D3D8}" dt="2020-04-15T05:27:36.646" v="12" actId="26606"/>
@@ -1976,7 +2257,7 @@
           <a:p>
             <a:fld id="{9184DA70-C731-4C70-880D-CCD4705E623C}" type="datetime1">
               <a:rPr lang="en-US" smtClean="0"/>
-              <a:t>4/15/2020</a:t>
+              <a:t>4/16/2020</a:t>
             </a:fld>
             <a:endParaRPr lang="en-US" dirty="0"/>
           </a:p>
@@ -2164,7 +2445,7 @@
           <a:p>
             <a:fld id="{B612A279-0833-481D-8C56-F67FD0AC6C50}" type="datetime1">
               <a:rPr lang="en-US" smtClean="0"/>
-              <a:t>4/15/2020</a:t>
+              <a:t>4/16/2020</a:t>
             </a:fld>
             <a:endParaRPr lang="en-US" dirty="0"/>
           </a:p>
@@ -2406,7 +2687,7 @@
           <a:p>
             <a:fld id="{6587DA83-5663-4C9C-B9AA-0B40A3DAFF81}" type="datetime1">
               <a:rPr lang="en-US" smtClean="0"/>
-              <a:t>4/15/2020</a:t>
+              <a:t>4/16/2020</a:t>
             </a:fld>
             <a:endParaRPr lang="en-US" dirty="0"/>
           </a:p>
@@ -2594,7 +2875,7 @@
           <a:p>
             <a:fld id="{4BE1D723-8F53-4F53-90B0-1982A396982E}" type="datetime1">
               <a:rPr lang="en-US" smtClean="0"/>
-              <a:t>4/15/2020</a:t>
+              <a:t>4/16/2020</a:t>
             </a:fld>
             <a:endParaRPr lang="en-US" dirty="0"/>
           </a:p>
@@ -2967,7 +3248,7 @@
           <a:p>
             <a:fld id="{97669AF7-7BEB-44E4-9852-375E34362B5B}" type="datetime1">
               <a:rPr lang="en-US" smtClean="0"/>
-              <a:t>4/15/2020</a:t>
+              <a:t>4/16/2020</a:t>
             </a:fld>
             <a:endParaRPr lang="en-US" dirty="0"/>
           </a:p>
@@ -3222,7 +3503,7 @@
           <a:p>
             <a:fld id="{BAAAC38D-0552-4C82-B593-E6124DFADBE2}" type="datetime1">
               <a:rPr lang="en-US" smtClean="0"/>
-              <a:t>4/15/2020</a:t>
+              <a:t>4/16/2020</a:t>
             </a:fld>
             <a:endParaRPr lang="en-US" dirty="0"/>
           </a:p>
@@ -3619,7 +3900,7 @@
           <a:p>
             <a:fld id="{D9DF0F1C-5577-4ACB-BB62-DF8F3C494C7E}" type="datetime1">
               <a:rPr lang="en-US" smtClean="0"/>
-              <a:t>4/15/2020</a:t>
+              <a:t>4/16/2020</a:t>
             </a:fld>
             <a:endParaRPr lang="en-US" dirty="0"/>
           </a:p>
@@ -3755,7 +4036,7 @@
           <a:p>
             <a:fld id="{1775B394-D9F9-4F0C-B15D-605F45CB9E9F}" type="datetime1">
               <a:rPr lang="en-US" smtClean="0"/>
-              <a:t>4/15/2020</a:t>
+              <a:t>4/16/2020</a:t>
             </a:fld>
             <a:endParaRPr lang="en-US" dirty="0"/>
           </a:p>
@@ -3912,7 +4193,7 @@
           <a:p>
             <a:fld id="{39667345-2558-425A-8533-9BFDBCE15005}" type="datetime1">
               <a:rPr lang="en-US" smtClean="0"/>
-              <a:t>4/15/2020</a:t>
+              <a:t>4/16/2020</a:t>
             </a:fld>
             <a:endParaRPr lang="en-US" dirty="0"/>
           </a:p>
@@ -4241,7 +4522,7 @@
           <a:p>
             <a:fld id="{92BEA474-078D-4E9B-9B14-09A87B19DC46}" type="datetime1">
               <a:rPr lang="en-US" smtClean="0"/>
-              <a:t>4/15/2020</a:t>
+              <a:t>4/16/2020</a:t>
             </a:fld>
             <a:endParaRPr lang="en-US" dirty="0"/>
           </a:p>
@@ -4591,7 +4872,7 @@
           <a:p>
             <a:fld id="{4907D986-8816-4272-A432-0437A28A9828}" type="datetime1">
               <a:rPr lang="en-US" smtClean="0"/>
-              <a:t>4/15/2020</a:t>
+              <a:t>4/16/2020</a:t>
             </a:fld>
             <a:endParaRPr lang="en-US" dirty="0"/>
           </a:p>
@@ -4852,7 +5133,7 @@
           <a:p>
             <a:fld id="{62D6E202-B606-4609-B914-27C9371A1F6D}" type="datetime1">
               <a:rPr lang="en-US" smtClean="0"/>
-              <a:t>4/15/2020</a:t>
+              <a:t>4/16/2020</a:t>
             </a:fld>
             <a:endParaRPr lang="en-US" dirty="0"/>
           </a:p>
@@ -5453,7 +5734,7 @@
         </p:blipFill>
         <p:spPr>
           <a:xfrm>
-            <a:off x="0" y="-46181"/>
+            <a:off x="0" y="0"/>
             <a:ext cx="12192000" cy="6858000"/>
           </a:xfrm>
           <a:prstGeom prst="rect">
@@ -5461,10 +5742,672 @@
           </a:prstGeom>
         </p:spPr>
       </p:pic>
+      <p:sp>
+        <p:nvSpPr>
+          <p:cNvPr id="6" name="Rectangle 5">
+            <a:extLst>
+              <a:ext uri="{FF2B5EF4-FFF2-40B4-BE49-F238E27FC236}">
+                <a16:creationId xmlns:a16="http://schemas.microsoft.com/office/drawing/2014/main" id="{7C80DD5C-5E1B-4E4D-B4D4-F5CC3BB37D8E}"/>
+              </a:ext>
+            </a:extLst>
+          </p:cNvPr>
+          <p:cNvSpPr/>
+          <p:nvPr/>
+        </p:nvSpPr>
+        <p:spPr>
+          <a:xfrm>
+            <a:off x="226503" y="5315390"/>
+            <a:ext cx="6434356" cy="1542610"/>
+          </a:xfrm>
+          <a:prstGeom prst="rect">
+            <a:avLst/>
+          </a:prstGeom>
+          <a:solidFill>
+            <a:srgbClr val="00A2E8"/>
+          </a:solidFill>
+          <a:ln>
+            <a:noFill/>
+          </a:ln>
+        </p:spPr>
+        <p:style>
+          <a:lnRef idx="0">
+            <a:scrgbClr r="0" g="0" b="0"/>
+          </a:lnRef>
+          <a:fillRef idx="0">
+            <a:scrgbClr r="0" g="0" b="0"/>
+          </a:fillRef>
+          <a:effectRef idx="0">
+            <a:scrgbClr r="0" g="0" b="0"/>
+          </a:effectRef>
+          <a:fontRef idx="minor">
+            <a:schemeClr val="lt1"/>
+          </a:fontRef>
+        </p:style>
+        <p:txBody>
+          <a:bodyPr rtlCol="0" anchor="ctr"/>
+          <a:lstStyle/>
+          <a:p>
+            <a:r>
+              <a:rPr lang="en-US" sz="4000" b="1" dirty="0">
+                <a:solidFill>
+                  <a:schemeClr val="tx1"/>
+                </a:solidFill>
+                <a:latin typeface="Arial" panose="020B0604020202020204" pitchFamily="34" charset="0"/>
+                <a:cs typeface="Arial" panose="020B0604020202020204" pitchFamily="34" charset="0"/>
+              </a:rPr>
+              <a:t>Student Attendance Tracking System (SATS) </a:t>
+            </a:r>
+          </a:p>
+        </p:txBody>
+      </p:sp>
     </p:spTree>
     <p:extLst>
       <p:ext uri="{BB962C8B-B14F-4D97-AF65-F5344CB8AC3E}">
         <p14:creationId xmlns:p14="http://schemas.microsoft.com/office/powerpoint/2010/main" val="1673448457"/>
+      </p:ext>
+    </p:extLst>
+  </p:cSld>
+  <p:clrMapOvr>
+    <a:masterClrMapping/>
+  </p:clrMapOvr>
+</p:sld>
+</file>
+
+<file path=ppt/slides/slide10.xml><?xml version="1.0" encoding="utf-8"?>
+<p:sld xmlns:a="http://schemas.openxmlformats.org/drawingml/2006/main" xmlns:r="http://schemas.openxmlformats.org/officeDocument/2006/relationships" xmlns:p="http://schemas.openxmlformats.org/presentationml/2006/main">
+  <p:cSld>
+    <p:spTree>
+      <p:nvGrpSpPr>
+        <p:cNvPr id="1" name=""/>
+        <p:cNvGrpSpPr/>
+        <p:nvPr/>
+      </p:nvGrpSpPr>
+      <p:grpSpPr>
+        <a:xfrm>
+          <a:off x="0" y="0"/>
+          <a:ext cx="0" cy="0"/>
+          <a:chOff x="0" y="0"/>
+          <a:chExt cx="0" cy="0"/>
+        </a:xfrm>
+      </p:grpSpPr>
+      <p:sp>
+        <p:nvSpPr>
+          <p:cNvPr id="10" name="Rectangle 9">
+            <a:extLst>
+              <a:ext uri="{FF2B5EF4-FFF2-40B4-BE49-F238E27FC236}">
+                <a16:creationId xmlns:a16="http://schemas.microsoft.com/office/drawing/2014/main" id="{4EF09A9C-D21C-410E-90D5-3F1CCFBDE78F}"/>
+              </a:ext>
+            </a:extLst>
+          </p:cNvPr>
+          <p:cNvSpPr/>
+          <p:nvPr/>
+        </p:nvSpPr>
+        <p:spPr>
+          <a:xfrm>
+            <a:off x="0" y="0"/>
+            <a:ext cx="2983345" cy="6858000"/>
+          </a:xfrm>
+          <a:prstGeom prst="rect">
+            <a:avLst/>
+          </a:prstGeom>
+        </p:spPr>
+        <p:style>
+          <a:lnRef idx="2">
+            <a:schemeClr val="accent1">
+              <a:shade val="50000"/>
+            </a:schemeClr>
+          </a:lnRef>
+          <a:fillRef idx="1">
+            <a:schemeClr val="accent1"/>
+          </a:fillRef>
+          <a:effectRef idx="0">
+            <a:schemeClr val="accent1"/>
+          </a:effectRef>
+          <a:fontRef idx="minor">
+            <a:schemeClr val="lt1"/>
+          </a:fontRef>
+        </p:style>
+        <p:txBody>
+          <a:bodyPr rtlCol="0" anchor="ctr"/>
+          <a:lstStyle/>
+          <a:p>
+            <a:pPr algn="ctr"/>
+            <a:endParaRPr lang="en-US"/>
+          </a:p>
+        </p:txBody>
+      </p:sp>
+      <p:sp>
+        <p:nvSpPr>
+          <p:cNvPr id="7" name="TextBox 6">
+            <a:extLst>
+              <a:ext uri="{FF2B5EF4-FFF2-40B4-BE49-F238E27FC236}">
+                <a16:creationId xmlns:a16="http://schemas.microsoft.com/office/drawing/2014/main" id="{DEFB70A6-540E-4C05-9201-0F66297EF0C0}"/>
+              </a:ext>
+            </a:extLst>
+          </p:cNvPr>
+          <p:cNvSpPr txBox="1"/>
+          <p:nvPr/>
+        </p:nvSpPr>
+        <p:spPr>
+          <a:xfrm>
+            <a:off x="-1099128" y="1748133"/>
+            <a:ext cx="5181600" cy="461665"/>
+          </a:xfrm>
+          <a:prstGeom prst="rect">
+            <a:avLst/>
+          </a:prstGeom>
+          <a:noFill/>
+        </p:spPr>
+        <p:txBody>
+          <a:bodyPr wrap="square" rtlCol="0">
+            <a:spAutoFit/>
+          </a:bodyPr>
+          <a:lstStyle/>
+          <a:p>
+            <a:pPr algn="ctr"/>
+            <a:r>
+              <a:rPr lang="en-US" sz="2400" b="1" dirty="0">
+                <a:latin typeface="Arial" panose="020B0604020202020204" pitchFamily="34" charset="0"/>
+                <a:cs typeface="Arial" panose="020B0604020202020204" pitchFamily="34" charset="0"/>
+              </a:rPr>
+              <a:t>SATS Requirements</a:t>
+            </a:r>
+          </a:p>
+        </p:txBody>
+      </p:sp>
+      <p:pic>
+        <p:nvPicPr>
+          <p:cNvPr id="6" name="Picture 5" descr="A close up of a logo&#10;&#10;Description automatically generated">
+            <a:extLst>
+              <a:ext uri="{FF2B5EF4-FFF2-40B4-BE49-F238E27FC236}">
+                <a16:creationId xmlns:a16="http://schemas.microsoft.com/office/drawing/2014/main" id="{AB4398E1-9856-4BB4-9F23-0C4864AC49C2}"/>
+              </a:ext>
+            </a:extLst>
+          </p:cNvPr>
+          <p:cNvPicPr>
+            <a:picLocks noChangeAspect="1"/>
+          </p:cNvPicPr>
+          <p:nvPr/>
+        </p:nvPicPr>
+        <p:blipFill>
+          <a:blip r:embed="rId2">
+            <a:alphaModFix/>
+            <a:extLst>
+              <a:ext uri="{28A0092B-C50C-407E-A947-70E740481C1C}">
+                <a14:useLocalDpi xmlns:a14="http://schemas.microsoft.com/office/drawing/2010/main" val="0"/>
+              </a:ext>
+            </a:extLst>
+          </a:blip>
+          <a:stretch>
+            <a:fillRect/>
+          </a:stretch>
+        </p:blipFill>
+        <p:spPr>
+          <a:xfrm>
+            <a:off x="147781" y="2849492"/>
+            <a:ext cx="2687782" cy="2387526"/>
+          </a:xfrm>
+          <a:prstGeom prst="rect">
+            <a:avLst/>
+          </a:prstGeom>
+        </p:spPr>
+      </p:pic>
+      <p:sp>
+        <p:nvSpPr>
+          <p:cNvPr id="4" name="Rectangle 3">
+            <a:extLst>
+              <a:ext uri="{FF2B5EF4-FFF2-40B4-BE49-F238E27FC236}">
+                <a16:creationId xmlns:a16="http://schemas.microsoft.com/office/drawing/2014/main" id="{8C97785B-54BA-4BBB-A3F8-278A29CACEB5}"/>
+              </a:ext>
+            </a:extLst>
+          </p:cNvPr>
+          <p:cNvSpPr/>
+          <p:nvPr/>
+        </p:nvSpPr>
+        <p:spPr>
+          <a:xfrm>
+            <a:off x="2983344" y="0"/>
+            <a:ext cx="9208655" cy="6858000"/>
+          </a:xfrm>
+          <a:prstGeom prst="rect">
+            <a:avLst/>
+          </a:prstGeom>
+          <a:solidFill>
+            <a:schemeClr val="bg1"/>
+          </a:solidFill>
+        </p:spPr>
+        <p:style>
+          <a:lnRef idx="2">
+            <a:schemeClr val="accent1">
+              <a:shade val="50000"/>
+            </a:schemeClr>
+          </a:lnRef>
+          <a:fillRef idx="1">
+            <a:schemeClr val="accent1"/>
+          </a:fillRef>
+          <a:effectRef idx="0">
+            <a:schemeClr val="accent1"/>
+          </a:effectRef>
+          <a:fontRef idx="minor">
+            <a:schemeClr val="lt1"/>
+          </a:fontRef>
+        </p:style>
+        <p:txBody>
+          <a:bodyPr rtlCol="0" anchor="ctr"/>
+          <a:lstStyle/>
+          <a:p>
+            <a:pPr algn="ctr"/>
+            <a:endParaRPr lang="en-US"/>
+          </a:p>
+        </p:txBody>
+      </p:sp>
+      <p:sp>
+        <p:nvSpPr>
+          <p:cNvPr id="13" name="Rectangle 12">
+            <a:extLst>
+              <a:ext uri="{FF2B5EF4-FFF2-40B4-BE49-F238E27FC236}">
+                <a16:creationId xmlns:a16="http://schemas.microsoft.com/office/drawing/2014/main" id="{F8B97EC3-654A-4821-B0E9-70E25D9FCBF9}"/>
+              </a:ext>
+            </a:extLst>
+          </p:cNvPr>
+          <p:cNvSpPr/>
+          <p:nvPr/>
+        </p:nvSpPr>
+        <p:spPr>
+          <a:xfrm>
+            <a:off x="2983341" y="4657439"/>
+            <a:ext cx="9208657" cy="2200561"/>
+          </a:xfrm>
+          <a:prstGeom prst="rect">
+            <a:avLst/>
+          </a:prstGeom>
+          <a:solidFill>
+            <a:schemeClr val="accent1">
+              <a:lumMod val="40000"/>
+              <a:lumOff val="60000"/>
+            </a:schemeClr>
+          </a:solidFill>
+        </p:spPr>
+        <p:style>
+          <a:lnRef idx="2">
+            <a:schemeClr val="accent1">
+              <a:shade val="50000"/>
+            </a:schemeClr>
+          </a:lnRef>
+          <a:fillRef idx="1">
+            <a:schemeClr val="accent1"/>
+          </a:fillRef>
+          <a:effectRef idx="0">
+            <a:schemeClr val="accent1"/>
+          </a:effectRef>
+          <a:fontRef idx="minor">
+            <a:schemeClr val="lt1"/>
+          </a:fontRef>
+        </p:style>
+        <p:txBody>
+          <a:bodyPr rtlCol="0" anchor="ctr"/>
+          <a:lstStyle/>
+          <a:p>
+            <a:pPr algn="ctr"/>
+            <a:endParaRPr lang="en-US" dirty="0"/>
+          </a:p>
+        </p:txBody>
+      </p:sp>
+      <p:sp>
+        <p:nvSpPr>
+          <p:cNvPr id="14" name="Rectangle 13">
+            <a:extLst>
+              <a:ext uri="{FF2B5EF4-FFF2-40B4-BE49-F238E27FC236}">
+                <a16:creationId xmlns:a16="http://schemas.microsoft.com/office/drawing/2014/main" id="{EE2AADA8-AD5B-4566-B6A4-974C76A3AF6E}"/>
+              </a:ext>
+            </a:extLst>
+          </p:cNvPr>
+          <p:cNvSpPr/>
+          <p:nvPr/>
+        </p:nvSpPr>
+        <p:spPr>
+          <a:xfrm>
+            <a:off x="2983340" y="2269913"/>
+            <a:ext cx="9208657" cy="2387526"/>
+          </a:xfrm>
+          <a:prstGeom prst="rect">
+            <a:avLst/>
+          </a:prstGeom>
+          <a:solidFill>
+            <a:schemeClr val="accent1">
+              <a:lumMod val="40000"/>
+              <a:lumOff val="60000"/>
+            </a:schemeClr>
+          </a:solidFill>
+        </p:spPr>
+        <p:style>
+          <a:lnRef idx="2">
+            <a:schemeClr val="accent1">
+              <a:shade val="50000"/>
+            </a:schemeClr>
+          </a:lnRef>
+          <a:fillRef idx="1">
+            <a:schemeClr val="accent1"/>
+          </a:fillRef>
+          <a:effectRef idx="0">
+            <a:schemeClr val="accent1"/>
+          </a:effectRef>
+          <a:fontRef idx="minor">
+            <a:schemeClr val="lt1"/>
+          </a:fontRef>
+        </p:style>
+        <p:txBody>
+          <a:bodyPr rtlCol="0" anchor="ctr"/>
+          <a:lstStyle/>
+          <a:p>
+            <a:pPr algn="ctr"/>
+            <a:endParaRPr lang="en-US" dirty="0"/>
+          </a:p>
+        </p:txBody>
+      </p:sp>
+      <p:sp>
+        <p:nvSpPr>
+          <p:cNvPr id="15" name="Rectangle 14">
+            <a:extLst>
+              <a:ext uri="{FF2B5EF4-FFF2-40B4-BE49-F238E27FC236}">
+                <a16:creationId xmlns:a16="http://schemas.microsoft.com/office/drawing/2014/main" id="{568144AC-FB09-4F9D-8D79-15320DDA2397}"/>
+              </a:ext>
+            </a:extLst>
+          </p:cNvPr>
+          <p:cNvSpPr/>
+          <p:nvPr/>
+        </p:nvSpPr>
+        <p:spPr>
+          <a:xfrm>
+            <a:off x="2983338" y="0"/>
+            <a:ext cx="9208657" cy="2299855"/>
+          </a:xfrm>
+          <a:prstGeom prst="rect">
+            <a:avLst/>
+          </a:prstGeom>
+          <a:solidFill>
+            <a:schemeClr val="accent1">
+              <a:lumMod val="40000"/>
+              <a:lumOff val="60000"/>
+            </a:schemeClr>
+          </a:solidFill>
+        </p:spPr>
+        <p:style>
+          <a:lnRef idx="2">
+            <a:schemeClr val="accent1">
+              <a:shade val="50000"/>
+            </a:schemeClr>
+          </a:lnRef>
+          <a:fillRef idx="1">
+            <a:schemeClr val="accent1"/>
+          </a:fillRef>
+          <a:effectRef idx="0">
+            <a:schemeClr val="accent1"/>
+          </a:effectRef>
+          <a:fontRef idx="minor">
+            <a:schemeClr val="lt1"/>
+          </a:fontRef>
+        </p:style>
+        <p:txBody>
+          <a:bodyPr rtlCol="0" anchor="ctr"/>
+          <a:lstStyle/>
+          <a:p>
+            <a:pPr algn="ctr"/>
+            <a:endParaRPr lang="en-US" dirty="0"/>
+          </a:p>
+        </p:txBody>
+      </p:sp>
+      <p:pic>
+        <p:nvPicPr>
+          <p:cNvPr id="9" name="Picture 8" descr="A picture containing plate&#10;&#10;Description automatically generated">
+            <a:extLst>
+              <a:ext uri="{FF2B5EF4-FFF2-40B4-BE49-F238E27FC236}">
+                <a16:creationId xmlns:a16="http://schemas.microsoft.com/office/drawing/2014/main" id="{3189AA45-4B84-485A-BAEA-3C9F651B697D}"/>
+              </a:ext>
+            </a:extLst>
+          </p:cNvPr>
+          <p:cNvPicPr>
+            <a:picLocks noChangeAspect="1"/>
+          </p:cNvPicPr>
+          <p:nvPr/>
+        </p:nvPicPr>
+        <p:blipFill>
+          <a:blip r:embed="rId3">
+            <a:extLst>
+              <a:ext uri="{28A0092B-C50C-407E-A947-70E740481C1C}">
+                <a14:useLocalDpi xmlns:a14="http://schemas.microsoft.com/office/drawing/2010/main" val="0"/>
+              </a:ext>
+            </a:extLst>
+          </a:blip>
+          <a:stretch>
+            <a:fillRect/>
+          </a:stretch>
+        </p:blipFill>
+        <p:spPr>
+          <a:xfrm>
+            <a:off x="2983334" y="146665"/>
+            <a:ext cx="2456872" cy="2006523"/>
+          </a:xfrm>
+          <a:prstGeom prst="rect">
+            <a:avLst/>
+          </a:prstGeom>
+        </p:spPr>
+      </p:pic>
+      <p:pic>
+        <p:nvPicPr>
+          <p:cNvPr id="17" name="Picture 16" descr="A close up of a sign&#10;&#10;Description automatically generated">
+            <a:extLst>
+              <a:ext uri="{FF2B5EF4-FFF2-40B4-BE49-F238E27FC236}">
+                <a16:creationId xmlns:a16="http://schemas.microsoft.com/office/drawing/2014/main" id="{2201847A-A353-4D2D-B9F9-C11A91A8DE51}"/>
+              </a:ext>
+            </a:extLst>
+          </p:cNvPr>
+          <p:cNvPicPr>
+            <a:picLocks noChangeAspect="1"/>
+          </p:cNvPicPr>
+          <p:nvPr/>
+        </p:nvPicPr>
+        <p:blipFill>
+          <a:blip r:embed="rId4">
+            <a:extLst>
+              <a:ext uri="{28A0092B-C50C-407E-A947-70E740481C1C}">
+                <a14:useLocalDpi xmlns:a14="http://schemas.microsoft.com/office/drawing/2010/main" val="0"/>
+              </a:ext>
+            </a:extLst>
+          </a:blip>
+          <a:stretch>
+            <a:fillRect/>
+          </a:stretch>
+        </p:blipFill>
+        <p:spPr>
+          <a:xfrm>
+            <a:off x="3131121" y="2481784"/>
+            <a:ext cx="1791860" cy="1933684"/>
+          </a:xfrm>
+          <a:prstGeom prst="rect">
+            <a:avLst/>
+          </a:prstGeom>
+        </p:spPr>
+      </p:pic>
+      <p:pic>
+        <p:nvPicPr>
+          <p:cNvPr id="21" name="Picture 20" descr="A close up of a device&#10;&#10;Description automatically generated">
+            <a:extLst>
+              <a:ext uri="{FF2B5EF4-FFF2-40B4-BE49-F238E27FC236}">
+                <a16:creationId xmlns:a16="http://schemas.microsoft.com/office/drawing/2014/main" id="{17F36DBE-FD76-4DD6-BDCD-41AA4704F538}"/>
+              </a:ext>
+            </a:extLst>
+          </p:cNvPr>
+          <p:cNvPicPr>
+            <a:picLocks noChangeAspect="1"/>
+          </p:cNvPicPr>
+          <p:nvPr/>
+        </p:nvPicPr>
+        <p:blipFill>
+          <a:blip r:embed="rId5">
+            <a:extLst>
+              <a:ext uri="{28A0092B-C50C-407E-A947-70E740481C1C}">
+                <a14:useLocalDpi xmlns:a14="http://schemas.microsoft.com/office/drawing/2010/main" val="0"/>
+              </a:ext>
+            </a:extLst>
+          </a:blip>
+          <a:stretch>
+            <a:fillRect/>
+          </a:stretch>
+        </p:blipFill>
+        <p:spPr>
+          <a:xfrm>
+            <a:off x="3131121" y="4717554"/>
+            <a:ext cx="1985824" cy="1933685"/>
+          </a:xfrm>
+          <a:prstGeom prst="rect">
+            <a:avLst/>
+          </a:prstGeom>
+        </p:spPr>
+      </p:pic>
+      <p:sp>
+        <p:nvSpPr>
+          <p:cNvPr id="22" name="TextBox 21">
+            <a:extLst>
+              <a:ext uri="{FF2B5EF4-FFF2-40B4-BE49-F238E27FC236}">
+                <a16:creationId xmlns:a16="http://schemas.microsoft.com/office/drawing/2014/main" id="{E10CE438-CFB9-4E25-9C10-9510AF28DDFB}"/>
+              </a:ext>
+            </a:extLst>
+          </p:cNvPr>
+          <p:cNvSpPr txBox="1"/>
+          <p:nvPr/>
+        </p:nvSpPr>
+        <p:spPr>
+          <a:xfrm>
+            <a:off x="5689600" y="826760"/>
+            <a:ext cx="5902037" cy="646331"/>
+          </a:xfrm>
+          <a:prstGeom prst="rect">
+            <a:avLst/>
+          </a:prstGeom>
+          <a:noFill/>
+        </p:spPr>
+        <p:txBody>
+          <a:bodyPr wrap="square" rtlCol="0">
+            <a:spAutoFit/>
+          </a:bodyPr>
+          <a:lstStyle/>
+          <a:p>
+            <a:r>
+              <a:rPr lang="en-US" b="1" dirty="0">
+                <a:latin typeface="Arial" panose="020B0604020202020204" pitchFamily="34" charset="0"/>
+                <a:cs typeface="Arial" panose="020B0604020202020204" pitchFamily="34" charset="0"/>
+              </a:rPr>
+              <a:t>Database</a:t>
+            </a:r>
+            <a:r>
+              <a:rPr lang="en-US" dirty="0">
+                <a:latin typeface="Arial" panose="020B0604020202020204" pitchFamily="34" charset="0"/>
+                <a:cs typeface="Arial" panose="020B0604020202020204" pitchFamily="34" charset="0"/>
+              </a:rPr>
+              <a:t> storing student's information First name, Last name and student ID.</a:t>
+            </a:r>
+          </a:p>
+        </p:txBody>
+      </p:sp>
+      <p:sp>
+        <p:nvSpPr>
+          <p:cNvPr id="23" name="TextBox 22">
+            <a:extLst>
+              <a:ext uri="{FF2B5EF4-FFF2-40B4-BE49-F238E27FC236}">
+                <a16:creationId xmlns:a16="http://schemas.microsoft.com/office/drawing/2014/main" id="{8E6F0DD9-BE35-4C5F-95B3-97F9C618BBEA}"/>
+              </a:ext>
+            </a:extLst>
+          </p:cNvPr>
+          <p:cNvSpPr txBox="1"/>
+          <p:nvPr/>
+        </p:nvSpPr>
+        <p:spPr>
+          <a:xfrm>
+            <a:off x="5689600" y="3076970"/>
+            <a:ext cx="5828145" cy="646331"/>
+          </a:xfrm>
+          <a:prstGeom prst="rect">
+            <a:avLst/>
+          </a:prstGeom>
+          <a:noFill/>
+        </p:spPr>
+        <p:txBody>
+          <a:bodyPr wrap="square" rtlCol="0">
+            <a:spAutoFit/>
+          </a:bodyPr>
+          <a:lstStyle/>
+          <a:p>
+            <a:r>
+              <a:rPr lang="en-US" b="1" dirty="0">
+                <a:latin typeface="Arial" panose="020B0604020202020204" pitchFamily="34" charset="0"/>
+                <a:cs typeface="Arial" panose="020B0604020202020204" pitchFamily="34" charset="0"/>
+              </a:rPr>
+              <a:t>Excel file </a:t>
+            </a:r>
+            <a:r>
+              <a:rPr lang="en-US" dirty="0">
+                <a:latin typeface="Arial" panose="020B0604020202020204" pitchFamily="34" charset="0"/>
+                <a:cs typeface="Arial" panose="020B0604020202020204" pitchFamily="34" charset="0"/>
+              </a:rPr>
+              <a:t>compares the data from the scanning device with database and save it.</a:t>
+            </a:r>
+          </a:p>
+        </p:txBody>
+      </p:sp>
+      <p:sp>
+        <p:nvSpPr>
+          <p:cNvPr id="24" name="TextBox 23">
+            <a:extLst>
+              <a:ext uri="{FF2B5EF4-FFF2-40B4-BE49-F238E27FC236}">
+                <a16:creationId xmlns:a16="http://schemas.microsoft.com/office/drawing/2014/main" id="{19ABA289-6477-4B1C-8ADE-EEC5AA5330C3}"/>
+              </a:ext>
+            </a:extLst>
+          </p:cNvPr>
+          <p:cNvSpPr txBox="1"/>
+          <p:nvPr/>
+        </p:nvSpPr>
+        <p:spPr>
+          <a:xfrm>
+            <a:off x="5689600" y="5269595"/>
+            <a:ext cx="4978412" cy="923330"/>
+          </a:xfrm>
+          <a:prstGeom prst="rect">
+            <a:avLst/>
+          </a:prstGeom>
+          <a:noFill/>
+        </p:spPr>
+        <p:txBody>
+          <a:bodyPr wrap="square" rtlCol="0">
+            <a:spAutoFit/>
+          </a:bodyPr>
+          <a:lstStyle/>
+          <a:p>
+            <a:r>
+              <a:rPr lang="en-US" b="1" dirty="0">
+                <a:latin typeface="Arial" panose="020B0604020202020204" pitchFamily="34" charset="0"/>
+                <a:cs typeface="Arial" panose="020B0604020202020204" pitchFamily="34" charset="0"/>
+              </a:rPr>
+              <a:t>Compare and check </a:t>
+            </a:r>
+            <a:r>
+              <a:rPr lang="en-US" dirty="0">
+                <a:latin typeface="Arial" panose="020B0604020202020204" pitchFamily="34" charset="0"/>
+                <a:cs typeface="Arial" panose="020B0604020202020204" pitchFamily="34" charset="0"/>
+              </a:rPr>
+              <a:t>when the scanner scan’s a badge the system checks the ID of the badge in the database.</a:t>
+            </a:r>
+            <a:endParaRPr lang="en-US" b="1" dirty="0">
+              <a:latin typeface="Arial" panose="020B0604020202020204" pitchFamily="34" charset="0"/>
+              <a:cs typeface="Arial" panose="020B0604020202020204" pitchFamily="34" charset="0"/>
+            </a:endParaRPr>
+          </a:p>
+        </p:txBody>
+      </p:sp>
+    </p:spTree>
+    <p:extLst>
+      <p:ext uri="{BB962C8B-B14F-4D97-AF65-F5344CB8AC3E}">
+        <p14:creationId xmlns:p14="http://schemas.microsoft.com/office/powerpoint/2010/main" val="4218143676"/>
       </p:ext>
     </p:extLst>
   </p:cSld>
@@ -6643,35 +7586,8 @@
                 <a:latin typeface="Arial" panose="020B0604020202020204" pitchFamily="34" charset="0"/>
                 <a:cs typeface="Arial" panose="020B0604020202020204" pitchFamily="34" charset="0"/>
               </a:rPr>
-              <a:t>Skills : Java developer &amp; IOS </a:t>
-            </a:r>
-            <a:r>
-              <a:rPr lang="en-US" dirty="0" err="1">
-                <a:ln w="0"/>
-                <a:effectLst>
-                  <a:outerShdw blurRad="38100" dist="19050" dir="2700000" algn="tl" rotWithShape="0">
-                    <a:schemeClr val="dk1">
-                      <a:alpha val="40000"/>
-                    </a:schemeClr>
-                  </a:outerShdw>
-                </a:effectLst>
-                <a:latin typeface="Arial" panose="020B0604020202020204" pitchFamily="34" charset="0"/>
-                <a:cs typeface="Arial" panose="020B0604020202020204" pitchFamily="34" charset="0"/>
-              </a:rPr>
-              <a:t>deveolper</a:t>
-            </a:r>
-            <a:endParaRPr lang="en-US" dirty="0">
-              <a:ln w="0"/>
-              <a:effectLst>
-                <a:outerShdw blurRad="38100" dist="19050" dir="2700000" algn="tl" rotWithShape="0">
-                  <a:schemeClr val="dk1">
-                    <a:alpha val="40000"/>
-                  </a:schemeClr>
-                </a:outerShdw>
-              </a:effectLst>
-              <a:latin typeface="Arial" panose="020B0604020202020204" pitchFamily="34" charset="0"/>
-              <a:cs typeface="Arial" panose="020B0604020202020204" pitchFamily="34" charset="0"/>
-            </a:endParaRPr>
+              <a:t>Skills : Java developer &amp; IOS developer</a:t>
+            </a:r>
           </a:p>
           <a:p>
             <a:pPr algn="ctr"/>
@@ -7225,7 +8141,7 @@
                 <a:latin typeface="Arial" panose="020B0604020202020204" pitchFamily="34" charset="0"/>
                 <a:cs typeface="Arial" panose="020B0604020202020204" pitchFamily="34" charset="0"/>
               </a:rPr>
-              <a:t>Introduction To SATS</a:t>
+              <a:t>SATS Requirements </a:t>
             </a:r>
           </a:p>
         </p:txBody>
@@ -8402,6 +9318,2555 @@
     <p:extLst>
       <p:ext uri="{BB962C8B-B14F-4D97-AF65-F5344CB8AC3E}">
         <p14:creationId xmlns:p14="http://schemas.microsoft.com/office/powerpoint/2010/main" val="761113307"/>
+      </p:ext>
+    </p:extLst>
+  </p:cSld>
+  <p:clrMapOvr>
+    <a:masterClrMapping/>
+  </p:clrMapOvr>
+</p:sld>
+</file>
+
+<file path=ppt/slides/slide6.xml><?xml version="1.0" encoding="utf-8"?>
+<p:sld xmlns:a="http://schemas.openxmlformats.org/drawingml/2006/main" xmlns:r="http://schemas.openxmlformats.org/officeDocument/2006/relationships" xmlns:p="http://schemas.openxmlformats.org/presentationml/2006/main">
+  <p:cSld>
+    <p:spTree>
+      <p:nvGrpSpPr>
+        <p:cNvPr id="1" name=""/>
+        <p:cNvGrpSpPr/>
+        <p:nvPr/>
+      </p:nvGrpSpPr>
+      <p:grpSpPr>
+        <a:xfrm>
+          <a:off x="0" y="0"/>
+          <a:ext cx="0" cy="0"/>
+          <a:chOff x="0" y="0"/>
+          <a:chExt cx="0" cy="0"/>
+        </a:xfrm>
+      </p:grpSpPr>
+      <p:sp>
+        <p:nvSpPr>
+          <p:cNvPr id="2" name="Rectangle 1">
+            <a:extLst>
+              <a:ext uri="{FF2B5EF4-FFF2-40B4-BE49-F238E27FC236}">
+                <a16:creationId xmlns:a16="http://schemas.microsoft.com/office/drawing/2014/main" id="{58BDDBD7-7E73-446D-9A03-376A9F9D1AF1}"/>
+              </a:ext>
+            </a:extLst>
+          </p:cNvPr>
+          <p:cNvSpPr/>
+          <p:nvPr/>
+        </p:nvSpPr>
+        <p:spPr>
+          <a:xfrm>
+            <a:off x="0" y="0"/>
+            <a:ext cx="3506598" cy="6858000"/>
+          </a:xfrm>
+          <a:prstGeom prst="rect">
+            <a:avLst/>
+          </a:prstGeom>
+        </p:spPr>
+        <p:style>
+          <a:lnRef idx="2">
+            <a:schemeClr val="accent1">
+              <a:shade val="50000"/>
+            </a:schemeClr>
+          </a:lnRef>
+          <a:fillRef idx="1">
+            <a:schemeClr val="accent1"/>
+          </a:fillRef>
+          <a:effectRef idx="0">
+            <a:schemeClr val="accent1"/>
+          </a:effectRef>
+          <a:fontRef idx="minor">
+            <a:schemeClr val="lt1"/>
+          </a:fontRef>
+        </p:style>
+        <p:txBody>
+          <a:bodyPr rtlCol="0" anchor="ctr"/>
+          <a:lstStyle/>
+          <a:p>
+            <a:pPr algn="ctr"/>
+            <a:endParaRPr lang="en-US" sz="2800" b="1" dirty="0">
+              <a:solidFill>
+                <a:schemeClr val="tx1"/>
+              </a:solidFill>
+              <a:latin typeface="Arial" panose="020B0604020202020204" pitchFamily="34" charset="0"/>
+              <a:cs typeface="Arial" panose="020B0604020202020204" pitchFamily="34" charset="0"/>
+            </a:endParaRPr>
+          </a:p>
+        </p:txBody>
+      </p:sp>
+      <p:pic>
+        <p:nvPicPr>
+          <p:cNvPr id="5" name="Picture 4" descr="A close up of a sign&#10;&#10;Description automatically generated">
+            <a:extLst>
+              <a:ext uri="{FF2B5EF4-FFF2-40B4-BE49-F238E27FC236}">
+                <a16:creationId xmlns:a16="http://schemas.microsoft.com/office/drawing/2014/main" id="{93A2A2FB-3A2B-4895-9496-9DFAA1C23066}"/>
+              </a:ext>
+            </a:extLst>
+          </p:cNvPr>
+          <p:cNvPicPr>
+            <a:picLocks noChangeAspect="1"/>
+          </p:cNvPicPr>
+          <p:nvPr/>
+        </p:nvPicPr>
+        <p:blipFill>
+          <a:blip r:embed="rId2">
+            <a:extLst>
+              <a:ext uri="{28A0092B-C50C-407E-A947-70E740481C1C}">
+                <a14:useLocalDpi xmlns:a14="http://schemas.microsoft.com/office/drawing/2010/main" val="0"/>
+              </a:ext>
+            </a:extLst>
+          </a:blip>
+          <a:stretch>
+            <a:fillRect/>
+          </a:stretch>
+        </p:blipFill>
+        <p:spPr>
+          <a:xfrm>
+            <a:off x="0" y="2710682"/>
+            <a:ext cx="3422709" cy="2687973"/>
+          </a:xfrm>
+          <a:prstGeom prst="rect">
+            <a:avLst/>
+          </a:prstGeom>
+        </p:spPr>
+      </p:pic>
+      <p:sp>
+        <p:nvSpPr>
+          <p:cNvPr id="8" name="Rectangle 7">
+            <a:extLst>
+              <a:ext uri="{FF2B5EF4-FFF2-40B4-BE49-F238E27FC236}">
+                <a16:creationId xmlns:a16="http://schemas.microsoft.com/office/drawing/2014/main" id="{FC7DDFC1-775D-4591-B258-C15FF8CD6E2E}"/>
+              </a:ext>
+            </a:extLst>
+          </p:cNvPr>
+          <p:cNvSpPr/>
+          <p:nvPr/>
+        </p:nvSpPr>
+        <p:spPr>
+          <a:xfrm>
+            <a:off x="3506598" y="0"/>
+            <a:ext cx="8685402" cy="6858000"/>
+          </a:xfrm>
+          <a:prstGeom prst="rect">
+            <a:avLst/>
+          </a:prstGeom>
+          <a:solidFill>
+            <a:schemeClr val="bg1"/>
+          </a:solidFill>
+        </p:spPr>
+        <p:style>
+          <a:lnRef idx="2">
+            <a:schemeClr val="accent1">
+              <a:shade val="50000"/>
+            </a:schemeClr>
+          </a:lnRef>
+          <a:fillRef idx="1">
+            <a:schemeClr val="accent1"/>
+          </a:fillRef>
+          <a:effectRef idx="0">
+            <a:schemeClr val="accent1"/>
+          </a:effectRef>
+          <a:fontRef idx="minor">
+            <a:schemeClr val="lt1"/>
+          </a:fontRef>
+        </p:style>
+        <p:txBody>
+          <a:bodyPr rtlCol="0" anchor="ctr"/>
+          <a:lstStyle/>
+          <a:p>
+            <a:pPr algn="ctr"/>
+            <a:endParaRPr lang="en-US"/>
+          </a:p>
+        </p:txBody>
+      </p:sp>
+      <p:pic>
+        <p:nvPicPr>
+          <p:cNvPr id="7" name="Picture 6" descr="A close up of a logo&#10;&#10;Description automatically generated">
+            <a:extLst>
+              <a:ext uri="{FF2B5EF4-FFF2-40B4-BE49-F238E27FC236}">
+                <a16:creationId xmlns:a16="http://schemas.microsoft.com/office/drawing/2014/main" id="{D2923564-474A-4A0C-81F2-91ABA7C41B09}"/>
+              </a:ext>
+            </a:extLst>
+          </p:cNvPr>
+          <p:cNvPicPr>
+            <a:picLocks noChangeAspect="1"/>
+          </p:cNvPicPr>
+          <p:nvPr/>
+        </p:nvPicPr>
+        <p:blipFill>
+          <a:blip r:embed="rId3">
+            <a:alphaModFix amt="30000"/>
+            <a:extLst>
+              <a:ext uri="{28A0092B-C50C-407E-A947-70E740481C1C}">
+                <a14:useLocalDpi xmlns:a14="http://schemas.microsoft.com/office/drawing/2010/main" val="0"/>
+              </a:ext>
+            </a:extLst>
+          </a:blip>
+          <a:stretch>
+            <a:fillRect/>
+          </a:stretch>
+        </p:blipFill>
+        <p:spPr>
+          <a:xfrm>
+            <a:off x="3465033" y="-1"/>
+            <a:ext cx="8643839" cy="6858001"/>
+          </a:xfrm>
+          <a:prstGeom prst="rect">
+            <a:avLst/>
+          </a:prstGeom>
+        </p:spPr>
+      </p:pic>
+      <p:sp>
+        <p:nvSpPr>
+          <p:cNvPr id="9" name="TextBox 8">
+            <a:extLst>
+              <a:ext uri="{FF2B5EF4-FFF2-40B4-BE49-F238E27FC236}">
+                <a16:creationId xmlns:a16="http://schemas.microsoft.com/office/drawing/2014/main" id="{623C0E39-3E17-423C-ADA6-4158DB7E4033}"/>
+              </a:ext>
+            </a:extLst>
+          </p:cNvPr>
+          <p:cNvSpPr txBox="1"/>
+          <p:nvPr/>
+        </p:nvSpPr>
+        <p:spPr>
+          <a:xfrm>
+            <a:off x="41563" y="1200727"/>
+            <a:ext cx="3339582" cy="707886"/>
+          </a:xfrm>
+          <a:prstGeom prst="rect">
+            <a:avLst/>
+          </a:prstGeom>
+          <a:noFill/>
+        </p:spPr>
+        <p:txBody>
+          <a:bodyPr wrap="square" rtlCol="0">
+            <a:spAutoFit/>
+          </a:bodyPr>
+          <a:lstStyle/>
+          <a:p>
+            <a:pPr algn="ctr"/>
+            <a:r>
+              <a:rPr lang="en-US" sz="4000" b="1" dirty="0">
+                <a:latin typeface="Arial" panose="020B0604020202020204" pitchFamily="34" charset="0"/>
+                <a:cs typeface="Arial" panose="020B0604020202020204" pitchFamily="34" charset="0"/>
+              </a:rPr>
+              <a:t>Main Goals</a:t>
+            </a:r>
+          </a:p>
+        </p:txBody>
+      </p:sp>
+      <p:pic>
+        <p:nvPicPr>
+          <p:cNvPr id="23" name="Picture 22" descr="A picture containing light&#10;&#10;Description automatically generated">
+            <a:extLst>
+              <a:ext uri="{FF2B5EF4-FFF2-40B4-BE49-F238E27FC236}">
+                <a16:creationId xmlns:a16="http://schemas.microsoft.com/office/drawing/2014/main" id="{25C4C365-0E2C-4FD1-B608-B0F2FF49B216}"/>
+              </a:ext>
+            </a:extLst>
+          </p:cNvPr>
+          <p:cNvPicPr>
+            <a:picLocks noChangeAspect="1"/>
+          </p:cNvPicPr>
+          <p:nvPr/>
+        </p:nvPicPr>
+        <p:blipFill>
+          <a:blip r:embed="rId4">
+            <a:extLst>
+              <a:ext uri="{28A0092B-C50C-407E-A947-70E740481C1C}">
+                <a14:useLocalDpi xmlns:a14="http://schemas.microsoft.com/office/drawing/2010/main" val="0"/>
+              </a:ext>
+            </a:extLst>
+          </a:blip>
+          <a:stretch>
+            <a:fillRect/>
+          </a:stretch>
+        </p:blipFill>
+        <p:spPr>
+          <a:xfrm>
+            <a:off x="3410512" y="2402163"/>
+            <a:ext cx="2762946" cy="2073564"/>
+          </a:xfrm>
+          <a:prstGeom prst="rect">
+            <a:avLst/>
+          </a:prstGeom>
+        </p:spPr>
+      </p:pic>
+      <p:pic>
+        <p:nvPicPr>
+          <p:cNvPr id="24" name="Picture 23" descr="A picture containing light&#10;&#10;Description automatically generated">
+            <a:extLst>
+              <a:ext uri="{FF2B5EF4-FFF2-40B4-BE49-F238E27FC236}">
+                <a16:creationId xmlns:a16="http://schemas.microsoft.com/office/drawing/2014/main" id="{1F48D38E-322A-41B8-AB60-C84E79C2B037}"/>
+              </a:ext>
+            </a:extLst>
+          </p:cNvPr>
+          <p:cNvPicPr>
+            <a:picLocks noChangeAspect="1"/>
+          </p:cNvPicPr>
+          <p:nvPr/>
+        </p:nvPicPr>
+        <p:blipFill>
+          <a:blip r:embed="rId4">
+            <a:extLst>
+              <a:ext uri="{28A0092B-C50C-407E-A947-70E740481C1C}">
+                <a14:useLocalDpi xmlns:a14="http://schemas.microsoft.com/office/drawing/2010/main" val="0"/>
+              </a:ext>
+            </a:extLst>
+          </a:blip>
+          <a:stretch>
+            <a:fillRect/>
+          </a:stretch>
+        </p:blipFill>
+        <p:spPr>
+          <a:xfrm>
+            <a:off x="9387491" y="2402163"/>
+            <a:ext cx="2762946" cy="2073564"/>
+          </a:xfrm>
+          <a:prstGeom prst="rect">
+            <a:avLst/>
+          </a:prstGeom>
+        </p:spPr>
+      </p:pic>
+      <p:pic>
+        <p:nvPicPr>
+          <p:cNvPr id="25" name="Picture 24" descr="A picture containing light&#10;&#10;Description automatically generated">
+            <a:extLst>
+              <a:ext uri="{FF2B5EF4-FFF2-40B4-BE49-F238E27FC236}">
+                <a16:creationId xmlns:a16="http://schemas.microsoft.com/office/drawing/2014/main" id="{AD715580-608F-4A1F-94A3-792C51B61B66}"/>
+              </a:ext>
+            </a:extLst>
+          </p:cNvPr>
+          <p:cNvPicPr>
+            <a:picLocks noChangeAspect="1"/>
+          </p:cNvPicPr>
+          <p:nvPr/>
+        </p:nvPicPr>
+        <p:blipFill>
+          <a:blip r:embed="rId4">
+            <a:extLst>
+              <a:ext uri="{28A0092B-C50C-407E-A947-70E740481C1C}">
+                <a14:useLocalDpi xmlns:a14="http://schemas.microsoft.com/office/drawing/2010/main" val="0"/>
+              </a:ext>
+            </a:extLst>
+          </a:blip>
+          <a:stretch>
+            <a:fillRect/>
+          </a:stretch>
+        </p:blipFill>
+        <p:spPr>
+          <a:xfrm>
+            <a:off x="6402623" y="2392218"/>
+            <a:ext cx="2762946" cy="2073564"/>
+          </a:xfrm>
+          <a:prstGeom prst="rect">
+            <a:avLst/>
+          </a:prstGeom>
+        </p:spPr>
+      </p:pic>
+      <p:sp>
+        <p:nvSpPr>
+          <p:cNvPr id="28" name="TextBox 27">
+            <a:extLst>
+              <a:ext uri="{FF2B5EF4-FFF2-40B4-BE49-F238E27FC236}">
+                <a16:creationId xmlns:a16="http://schemas.microsoft.com/office/drawing/2014/main" id="{9329A980-9EFB-4929-8C2D-0505471C3A07}"/>
+              </a:ext>
+            </a:extLst>
+          </p:cNvPr>
+          <p:cNvSpPr txBox="1"/>
+          <p:nvPr/>
+        </p:nvSpPr>
+        <p:spPr>
+          <a:xfrm>
+            <a:off x="3811532" y="4821995"/>
+            <a:ext cx="1960906" cy="1846659"/>
+          </a:xfrm>
+          <a:prstGeom prst="rect">
+            <a:avLst/>
+          </a:prstGeom>
+          <a:noFill/>
+          <a:ln>
+            <a:solidFill>
+              <a:schemeClr val="accent2"/>
+            </a:solidFill>
+          </a:ln>
+        </p:spPr>
+        <p:txBody>
+          <a:bodyPr wrap="square" rtlCol="0">
+            <a:spAutoFit/>
+          </a:bodyPr>
+          <a:lstStyle/>
+          <a:p>
+            <a:pPr algn="ctr"/>
+            <a:r>
+              <a:rPr lang="en-US" sz="1600" dirty="0">
+                <a:latin typeface="Arial" panose="020B0604020202020204" pitchFamily="34" charset="0"/>
+                <a:cs typeface="Arial" panose="020B0604020202020204" pitchFamily="34" charset="0"/>
+              </a:rPr>
+              <a:t>Decreasing the time taken for attendance therefore increasing the time for teaching</a:t>
+            </a:r>
+          </a:p>
+          <a:p>
+            <a:pPr algn="ctr"/>
+            <a:r>
+              <a:rPr lang="en-US" dirty="0">
+                <a:latin typeface="Arial" panose="020B0604020202020204" pitchFamily="34" charset="0"/>
+                <a:cs typeface="Arial" panose="020B0604020202020204" pitchFamily="34" charset="0"/>
+              </a:rPr>
+              <a:t> </a:t>
+            </a:r>
+          </a:p>
+        </p:txBody>
+      </p:sp>
+      <p:sp>
+        <p:nvSpPr>
+          <p:cNvPr id="30" name="TextBox 29">
+            <a:extLst>
+              <a:ext uri="{FF2B5EF4-FFF2-40B4-BE49-F238E27FC236}">
+                <a16:creationId xmlns:a16="http://schemas.microsoft.com/office/drawing/2014/main" id="{21767AF9-1F20-4443-B644-450F466CF0DA}"/>
+              </a:ext>
+            </a:extLst>
+          </p:cNvPr>
+          <p:cNvSpPr txBox="1"/>
+          <p:nvPr/>
+        </p:nvSpPr>
+        <p:spPr>
+          <a:xfrm>
+            <a:off x="6806499" y="4775829"/>
+            <a:ext cx="1960906" cy="1877437"/>
+          </a:xfrm>
+          <a:prstGeom prst="rect">
+            <a:avLst/>
+          </a:prstGeom>
+          <a:noFill/>
+          <a:ln>
+            <a:solidFill>
+              <a:schemeClr val="accent2"/>
+            </a:solidFill>
+          </a:ln>
+        </p:spPr>
+        <p:txBody>
+          <a:bodyPr wrap="square" rtlCol="0">
+            <a:spAutoFit/>
+          </a:bodyPr>
+          <a:lstStyle/>
+          <a:p>
+            <a:pPr algn="ctr"/>
+            <a:r>
+              <a:rPr lang="en-US" sz="1600" dirty="0">
+                <a:latin typeface="Arial" panose="020B0604020202020204" pitchFamily="34" charset="0"/>
+                <a:cs typeface="Arial" panose="020B0604020202020204" pitchFamily="34" charset="0"/>
+              </a:rPr>
+              <a:t>Eliminating the chances of attending another student instead of the other </a:t>
+            </a:r>
+          </a:p>
+          <a:p>
+            <a:pPr algn="ctr"/>
+            <a:r>
+              <a:rPr lang="en-US" dirty="0">
+                <a:latin typeface="Arial" panose="020B0604020202020204" pitchFamily="34" charset="0"/>
+                <a:cs typeface="Arial" panose="020B0604020202020204" pitchFamily="34" charset="0"/>
+              </a:rPr>
+              <a:t> </a:t>
+            </a:r>
+          </a:p>
+          <a:p>
+            <a:pPr algn="ctr"/>
+            <a:endParaRPr lang="en-US" dirty="0">
+              <a:latin typeface="Arial" panose="020B0604020202020204" pitchFamily="34" charset="0"/>
+              <a:cs typeface="Arial" panose="020B0604020202020204" pitchFamily="34" charset="0"/>
+            </a:endParaRPr>
+          </a:p>
+        </p:txBody>
+      </p:sp>
+      <p:sp>
+        <p:nvSpPr>
+          <p:cNvPr id="32" name="TextBox 31">
+            <a:extLst>
+              <a:ext uri="{FF2B5EF4-FFF2-40B4-BE49-F238E27FC236}">
+                <a16:creationId xmlns:a16="http://schemas.microsoft.com/office/drawing/2014/main" id="{61ECC447-A050-4E95-BA50-A8AA8A354A6A}"/>
+              </a:ext>
+            </a:extLst>
+          </p:cNvPr>
+          <p:cNvSpPr txBox="1"/>
+          <p:nvPr/>
+        </p:nvSpPr>
+        <p:spPr>
+          <a:xfrm>
+            <a:off x="9801466" y="4837384"/>
+            <a:ext cx="1960906" cy="1815882"/>
+          </a:xfrm>
+          <a:prstGeom prst="rect">
+            <a:avLst/>
+          </a:prstGeom>
+          <a:noFill/>
+          <a:ln>
+            <a:solidFill>
+              <a:schemeClr val="accent2"/>
+            </a:solidFill>
+          </a:ln>
+        </p:spPr>
+        <p:txBody>
+          <a:bodyPr wrap="square" rtlCol="0">
+            <a:spAutoFit/>
+          </a:bodyPr>
+          <a:lstStyle/>
+          <a:p>
+            <a:pPr algn="ctr"/>
+            <a:r>
+              <a:rPr lang="en-US" sz="1600" dirty="0">
+                <a:latin typeface="Arial" panose="020B0604020202020204" pitchFamily="34" charset="0"/>
+                <a:cs typeface="Arial" panose="020B0604020202020204" pitchFamily="34" charset="0"/>
+              </a:rPr>
+              <a:t>Taking the responsibility of the professors to students so they have full responsibility over their attendance</a:t>
+            </a:r>
+          </a:p>
+        </p:txBody>
+      </p:sp>
+    </p:spTree>
+    <p:extLst>
+      <p:ext uri="{BB962C8B-B14F-4D97-AF65-F5344CB8AC3E}">
+        <p14:creationId xmlns:p14="http://schemas.microsoft.com/office/powerpoint/2010/main" val="3900144499"/>
+      </p:ext>
+    </p:extLst>
+  </p:cSld>
+  <p:clrMapOvr>
+    <a:masterClrMapping/>
+  </p:clrMapOvr>
+</p:sld>
+</file>
+
+<file path=ppt/slides/slide7.xml><?xml version="1.0" encoding="utf-8"?>
+<p:sld xmlns:a="http://schemas.openxmlformats.org/drawingml/2006/main" xmlns:r="http://schemas.openxmlformats.org/officeDocument/2006/relationships" xmlns:p="http://schemas.openxmlformats.org/presentationml/2006/main">
+  <p:cSld>
+    <p:bg>
+      <p:bgPr>
+        <a:solidFill>
+          <a:schemeClr val="bg1"/>
+        </a:solidFill>
+        <a:effectLst/>
+      </p:bgPr>
+    </p:bg>
+    <p:spTree>
+      <p:nvGrpSpPr>
+        <p:cNvPr id="1" name=""/>
+        <p:cNvGrpSpPr/>
+        <p:nvPr/>
+      </p:nvGrpSpPr>
+      <p:grpSpPr>
+        <a:xfrm>
+          <a:off x="0" y="0"/>
+          <a:ext cx="0" cy="0"/>
+          <a:chOff x="0" y="0"/>
+          <a:chExt cx="0" cy="0"/>
+        </a:xfrm>
+      </p:grpSpPr>
+      <p:sp>
+        <p:nvSpPr>
+          <p:cNvPr id="4" name="Rectangle 3">
+            <a:extLst>
+              <a:ext uri="{FF2B5EF4-FFF2-40B4-BE49-F238E27FC236}">
+                <a16:creationId xmlns:a16="http://schemas.microsoft.com/office/drawing/2014/main" id="{15333259-7A83-4072-95FF-90109D7572AA}"/>
+              </a:ext>
+            </a:extLst>
+          </p:cNvPr>
+          <p:cNvSpPr/>
+          <p:nvPr/>
+        </p:nvSpPr>
+        <p:spPr>
+          <a:xfrm>
+            <a:off x="0" y="0"/>
+            <a:ext cx="12192000" cy="6858000"/>
+          </a:xfrm>
+          <a:prstGeom prst="rect">
+            <a:avLst/>
+          </a:prstGeom>
+          <a:solidFill>
+            <a:schemeClr val="bg1"/>
+          </a:solidFill>
+        </p:spPr>
+        <p:style>
+          <a:lnRef idx="2">
+            <a:schemeClr val="accent1">
+              <a:shade val="50000"/>
+            </a:schemeClr>
+          </a:lnRef>
+          <a:fillRef idx="1">
+            <a:schemeClr val="accent1"/>
+          </a:fillRef>
+          <a:effectRef idx="0">
+            <a:schemeClr val="accent1"/>
+          </a:effectRef>
+          <a:fontRef idx="minor">
+            <a:schemeClr val="lt1"/>
+          </a:fontRef>
+        </p:style>
+        <p:txBody>
+          <a:bodyPr rtlCol="0" anchor="ctr"/>
+          <a:lstStyle/>
+          <a:p>
+            <a:pPr algn="ctr"/>
+            <a:endParaRPr lang="en-US"/>
+          </a:p>
+        </p:txBody>
+      </p:sp>
+      <p:pic>
+        <p:nvPicPr>
+          <p:cNvPr id="3" name="Picture 2" descr="A close up of a piece of paper&#10;&#10;Description automatically generated">
+            <a:extLst>
+              <a:ext uri="{FF2B5EF4-FFF2-40B4-BE49-F238E27FC236}">
+                <a16:creationId xmlns:a16="http://schemas.microsoft.com/office/drawing/2014/main" id="{C366B31A-B0F6-44E2-98DD-52FAF0DE3A27}"/>
+              </a:ext>
+            </a:extLst>
+          </p:cNvPr>
+          <p:cNvPicPr>
+            <a:picLocks noChangeAspect="1"/>
+          </p:cNvPicPr>
+          <p:nvPr/>
+        </p:nvPicPr>
+        <p:blipFill>
+          <a:blip r:embed="rId2">
+            <a:alphaModFix amt="20000"/>
+            <a:extLst>
+              <a:ext uri="{28A0092B-C50C-407E-A947-70E740481C1C}">
+                <a14:useLocalDpi xmlns:a14="http://schemas.microsoft.com/office/drawing/2010/main" val="0"/>
+              </a:ext>
+            </a:extLst>
+          </a:blip>
+          <a:stretch>
+            <a:fillRect/>
+          </a:stretch>
+        </p:blipFill>
+        <p:spPr>
+          <a:xfrm>
+            <a:off x="0" y="0"/>
+            <a:ext cx="12191999" cy="6858000"/>
+          </a:xfrm>
+          <a:prstGeom prst="rect">
+            <a:avLst/>
+          </a:prstGeom>
+        </p:spPr>
+      </p:pic>
+      <p:sp>
+        <p:nvSpPr>
+          <p:cNvPr id="5" name="Rectangle 4">
+            <a:extLst>
+              <a:ext uri="{FF2B5EF4-FFF2-40B4-BE49-F238E27FC236}">
+                <a16:creationId xmlns:a16="http://schemas.microsoft.com/office/drawing/2014/main" id="{084BB3F7-F0D1-4B10-B692-DE8DB50FEC26}"/>
+              </a:ext>
+            </a:extLst>
+          </p:cNvPr>
+          <p:cNvSpPr/>
+          <p:nvPr/>
+        </p:nvSpPr>
+        <p:spPr>
+          <a:xfrm>
+            <a:off x="2143701" y="455044"/>
+            <a:ext cx="7904600" cy="923330"/>
+          </a:xfrm>
+          <a:prstGeom prst="rect">
+            <a:avLst/>
+          </a:prstGeom>
+          <a:noFill/>
+        </p:spPr>
+        <p:txBody>
+          <a:bodyPr wrap="none" lIns="91440" tIns="45720" rIns="91440" bIns="45720">
+            <a:spAutoFit/>
+          </a:bodyPr>
+          <a:lstStyle/>
+          <a:p>
+            <a:pPr algn="ctr"/>
+            <a:r>
+              <a:rPr lang="en-US" sz="5400" dirty="0">
+                <a:ln w="0"/>
+                <a:effectLst>
+                  <a:glow rad="127000">
+                    <a:schemeClr val="accent1">
+                      <a:lumMod val="60000"/>
+                      <a:lumOff val="40000"/>
+                    </a:schemeClr>
+                  </a:glow>
+                  <a:outerShdw blurRad="38100" dist="19050" dir="2700000" algn="tl" rotWithShape="0">
+                    <a:schemeClr val="dk1">
+                      <a:alpha val="40000"/>
+                    </a:schemeClr>
+                  </a:outerShdw>
+                </a:effectLst>
+                <a:latin typeface="Arial" panose="020B0604020202020204" pitchFamily="34" charset="0"/>
+                <a:cs typeface="Arial" panose="020B0604020202020204" pitchFamily="34" charset="0"/>
+              </a:rPr>
+              <a:t>Why SATS is Important ?</a:t>
+            </a:r>
+            <a:endParaRPr lang="en-US" sz="5400" b="0" cap="none" spc="0" dirty="0">
+              <a:ln w="0"/>
+              <a:solidFill>
+                <a:schemeClr val="tx1"/>
+              </a:solidFill>
+              <a:effectLst>
+                <a:glow rad="127000">
+                  <a:schemeClr val="accent1">
+                    <a:lumMod val="60000"/>
+                    <a:lumOff val="40000"/>
+                  </a:schemeClr>
+                </a:glow>
+                <a:outerShdw blurRad="38100" dist="19050" dir="2700000" algn="tl" rotWithShape="0">
+                  <a:schemeClr val="dk1">
+                    <a:alpha val="40000"/>
+                  </a:schemeClr>
+                </a:outerShdw>
+              </a:effectLst>
+              <a:latin typeface="Arial" panose="020B0604020202020204" pitchFamily="34" charset="0"/>
+              <a:cs typeface="Arial" panose="020B0604020202020204" pitchFamily="34" charset="0"/>
+            </a:endParaRPr>
+          </a:p>
+        </p:txBody>
+      </p:sp>
+      <p:sp>
+        <p:nvSpPr>
+          <p:cNvPr id="2" name="TextBox 1">
+            <a:extLst>
+              <a:ext uri="{FF2B5EF4-FFF2-40B4-BE49-F238E27FC236}">
+                <a16:creationId xmlns:a16="http://schemas.microsoft.com/office/drawing/2014/main" id="{24FF851A-6B34-4B26-9271-37E8DE936A11}"/>
+              </a:ext>
+            </a:extLst>
+          </p:cNvPr>
+          <p:cNvSpPr txBox="1"/>
+          <p:nvPr/>
+        </p:nvSpPr>
+        <p:spPr>
+          <a:xfrm>
+            <a:off x="738908" y="2712239"/>
+            <a:ext cx="10464800" cy="523220"/>
+          </a:xfrm>
+          <a:prstGeom prst="rect">
+            <a:avLst/>
+          </a:prstGeom>
+          <a:noFill/>
+        </p:spPr>
+        <p:txBody>
+          <a:bodyPr wrap="square" rtlCol="0">
+            <a:spAutoFit/>
+          </a:bodyPr>
+          <a:lstStyle/>
+          <a:p>
+            <a:pPr algn="ctr"/>
+            <a:r>
+              <a:rPr lang="en-US" sz="2800" dirty="0">
+                <a:latin typeface="Arial" panose="020B0604020202020204" pitchFamily="34" charset="0"/>
+                <a:cs typeface="Arial" panose="020B0604020202020204" pitchFamily="34" charset="0"/>
+              </a:rPr>
+              <a:t>Reducing the time taken form the lecture for attendance </a:t>
+            </a:r>
+          </a:p>
+        </p:txBody>
+      </p:sp>
+    </p:spTree>
+    <p:extLst>
+      <p:ext uri="{BB962C8B-B14F-4D97-AF65-F5344CB8AC3E}">
+        <p14:creationId xmlns:p14="http://schemas.microsoft.com/office/powerpoint/2010/main" val="3609006249"/>
+      </p:ext>
+    </p:extLst>
+  </p:cSld>
+  <p:clrMapOvr>
+    <a:masterClrMapping/>
+  </p:clrMapOvr>
+</p:sld>
+</file>
+
+<file path=ppt/slides/slide8.xml><?xml version="1.0" encoding="utf-8"?>
+<p:sld xmlns:a="http://schemas.openxmlformats.org/drawingml/2006/main" xmlns:r="http://schemas.openxmlformats.org/officeDocument/2006/relationships" xmlns:p="http://schemas.openxmlformats.org/presentationml/2006/main">
+  <p:cSld>
+    <p:bg>
+      <p:bgPr>
+        <a:solidFill>
+          <a:schemeClr val="bg1"/>
+        </a:solidFill>
+        <a:effectLst/>
+      </p:bgPr>
+    </p:bg>
+    <p:spTree>
+      <p:nvGrpSpPr>
+        <p:cNvPr id="1" name=""/>
+        <p:cNvGrpSpPr/>
+        <p:nvPr/>
+      </p:nvGrpSpPr>
+      <p:grpSpPr>
+        <a:xfrm>
+          <a:off x="0" y="0"/>
+          <a:ext cx="0" cy="0"/>
+          <a:chOff x="0" y="0"/>
+          <a:chExt cx="0" cy="0"/>
+        </a:xfrm>
+      </p:grpSpPr>
+      <p:sp>
+        <p:nvSpPr>
+          <p:cNvPr id="8" name="Rectangle 7">
+            <a:extLst>
+              <a:ext uri="{FF2B5EF4-FFF2-40B4-BE49-F238E27FC236}">
+                <a16:creationId xmlns:a16="http://schemas.microsoft.com/office/drawing/2014/main" id="{C7E6B059-C52B-4078-BED1-DCC689E0D74B}"/>
+              </a:ext>
+            </a:extLst>
+          </p:cNvPr>
+          <p:cNvSpPr/>
+          <p:nvPr/>
+        </p:nvSpPr>
+        <p:spPr>
+          <a:xfrm>
+            <a:off x="-3" y="0"/>
+            <a:ext cx="12192000" cy="6858000"/>
+          </a:xfrm>
+          <a:prstGeom prst="rect">
+            <a:avLst/>
+          </a:prstGeom>
+          <a:solidFill>
+            <a:schemeClr val="bg1"/>
+          </a:solidFill>
+        </p:spPr>
+        <p:style>
+          <a:lnRef idx="2">
+            <a:schemeClr val="accent1">
+              <a:shade val="50000"/>
+            </a:schemeClr>
+          </a:lnRef>
+          <a:fillRef idx="1">
+            <a:schemeClr val="accent1"/>
+          </a:fillRef>
+          <a:effectRef idx="0">
+            <a:schemeClr val="accent1"/>
+          </a:effectRef>
+          <a:fontRef idx="minor">
+            <a:schemeClr val="lt1"/>
+          </a:fontRef>
+        </p:style>
+        <p:txBody>
+          <a:bodyPr rtlCol="0" anchor="ctr"/>
+          <a:lstStyle/>
+          <a:p>
+            <a:pPr algn="ctr"/>
+            <a:endParaRPr lang="en-US"/>
+          </a:p>
+        </p:txBody>
+      </p:sp>
+      <p:pic>
+        <p:nvPicPr>
+          <p:cNvPr id="7" name="Picture 6" descr="A picture containing outdoor, game&#10;&#10;Description automatically generated">
+            <a:extLst>
+              <a:ext uri="{FF2B5EF4-FFF2-40B4-BE49-F238E27FC236}">
+                <a16:creationId xmlns:a16="http://schemas.microsoft.com/office/drawing/2014/main" id="{F36B5C57-ACB3-48D7-88E8-B65245E226D6}"/>
+              </a:ext>
+            </a:extLst>
+          </p:cNvPr>
+          <p:cNvPicPr>
+            <a:picLocks noChangeAspect="1"/>
+          </p:cNvPicPr>
+          <p:nvPr/>
+        </p:nvPicPr>
+        <p:blipFill>
+          <a:blip r:embed="rId2">
+            <a:alphaModFix amt="20000"/>
+            <a:extLst>
+              <a:ext uri="{28A0092B-C50C-407E-A947-70E740481C1C}">
+                <a14:useLocalDpi xmlns:a14="http://schemas.microsoft.com/office/drawing/2010/main" val="0"/>
+              </a:ext>
+            </a:extLst>
+          </a:blip>
+          <a:stretch>
+            <a:fillRect/>
+          </a:stretch>
+        </p:blipFill>
+        <p:spPr>
+          <a:xfrm>
+            <a:off x="5624821" y="2043543"/>
+            <a:ext cx="3380509" cy="3001819"/>
+          </a:xfrm>
+          <a:prstGeom prst="rect">
+            <a:avLst/>
+          </a:prstGeom>
+        </p:spPr>
+      </p:pic>
+      <p:pic>
+        <p:nvPicPr>
+          <p:cNvPr id="12" name="Picture 11" descr="A close up of a sign&#10;&#10;Description automatically generated">
+            <a:extLst>
+              <a:ext uri="{FF2B5EF4-FFF2-40B4-BE49-F238E27FC236}">
+                <a16:creationId xmlns:a16="http://schemas.microsoft.com/office/drawing/2014/main" id="{0580DAF4-1AFF-45B4-8270-EA4F75E48775}"/>
+              </a:ext>
+            </a:extLst>
+          </p:cNvPr>
+          <p:cNvPicPr>
+            <a:picLocks noChangeAspect="1"/>
+          </p:cNvPicPr>
+          <p:nvPr/>
+        </p:nvPicPr>
+        <p:blipFill>
+          <a:blip r:embed="rId3">
+            <a:extLst>
+              <a:ext uri="{28A0092B-C50C-407E-A947-70E740481C1C}">
+                <a14:useLocalDpi xmlns:a14="http://schemas.microsoft.com/office/drawing/2010/main" val="0"/>
+              </a:ext>
+            </a:extLst>
+          </a:blip>
+          <a:stretch>
+            <a:fillRect/>
+          </a:stretch>
+        </p:blipFill>
+        <p:spPr>
+          <a:xfrm>
+            <a:off x="8986768" y="3077032"/>
+            <a:ext cx="1191490" cy="946944"/>
+          </a:xfrm>
+          <a:prstGeom prst="rect">
+            <a:avLst/>
+          </a:prstGeom>
+        </p:spPr>
+      </p:pic>
+      <p:pic>
+        <p:nvPicPr>
+          <p:cNvPr id="14" name="Picture 13" descr="A close up of a computer&#10;&#10;Description automatically generated">
+            <a:extLst>
+              <a:ext uri="{FF2B5EF4-FFF2-40B4-BE49-F238E27FC236}">
+                <a16:creationId xmlns:a16="http://schemas.microsoft.com/office/drawing/2014/main" id="{333DB5EA-7F27-49D1-B914-E4D280D3919E}"/>
+              </a:ext>
+            </a:extLst>
+          </p:cNvPr>
+          <p:cNvPicPr>
+            <a:picLocks noChangeAspect="1"/>
+          </p:cNvPicPr>
+          <p:nvPr/>
+        </p:nvPicPr>
+        <p:blipFill>
+          <a:blip r:embed="rId4">
+            <a:extLst>
+              <a:ext uri="{28A0092B-C50C-407E-A947-70E740481C1C}">
+                <a14:useLocalDpi xmlns:a14="http://schemas.microsoft.com/office/drawing/2010/main" val="0"/>
+              </a:ext>
+            </a:extLst>
+          </a:blip>
+          <a:stretch>
+            <a:fillRect/>
+          </a:stretch>
+        </p:blipFill>
+        <p:spPr>
+          <a:xfrm>
+            <a:off x="6529716" y="1001339"/>
+            <a:ext cx="1662547" cy="1443181"/>
+          </a:xfrm>
+          <a:prstGeom prst="rect">
+            <a:avLst/>
+          </a:prstGeom>
+        </p:spPr>
+      </p:pic>
+      <p:pic>
+        <p:nvPicPr>
+          <p:cNvPr id="16" name="Picture 15" descr="A close up of a sign&#10;&#10;Description automatically generated">
+            <a:extLst>
+              <a:ext uri="{FF2B5EF4-FFF2-40B4-BE49-F238E27FC236}">
+                <a16:creationId xmlns:a16="http://schemas.microsoft.com/office/drawing/2014/main" id="{3D9EED31-AF29-4AFA-BF90-64B0B781C50E}"/>
+              </a:ext>
+            </a:extLst>
+          </p:cNvPr>
+          <p:cNvPicPr>
+            <a:picLocks noChangeAspect="1"/>
+          </p:cNvPicPr>
+          <p:nvPr/>
+        </p:nvPicPr>
+        <p:blipFill>
+          <a:blip r:embed="rId5">
+            <a:extLst>
+              <a:ext uri="{28A0092B-C50C-407E-A947-70E740481C1C}">
+                <a14:useLocalDpi xmlns:a14="http://schemas.microsoft.com/office/drawing/2010/main" val="0"/>
+              </a:ext>
+            </a:extLst>
+          </a:blip>
+          <a:stretch>
+            <a:fillRect/>
+          </a:stretch>
+        </p:blipFill>
+        <p:spPr>
+          <a:xfrm>
+            <a:off x="4553434" y="3102437"/>
+            <a:ext cx="1071387" cy="896134"/>
+          </a:xfrm>
+          <a:prstGeom prst="rect">
+            <a:avLst/>
+          </a:prstGeom>
+        </p:spPr>
+      </p:pic>
+      <p:pic>
+        <p:nvPicPr>
+          <p:cNvPr id="18" name="Picture 17" descr="A picture containing circuit, computer&#10;&#10;Description automatically generated">
+            <a:extLst>
+              <a:ext uri="{FF2B5EF4-FFF2-40B4-BE49-F238E27FC236}">
+                <a16:creationId xmlns:a16="http://schemas.microsoft.com/office/drawing/2014/main" id="{DF663744-35AE-44F0-B103-0BAD0D202B5A}"/>
+              </a:ext>
+            </a:extLst>
+          </p:cNvPr>
+          <p:cNvPicPr>
+            <a:picLocks noChangeAspect="1"/>
+          </p:cNvPicPr>
+          <p:nvPr/>
+        </p:nvPicPr>
+        <p:blipFill>
+          <a:blip r:embed="rId6">
+            <a:extLst>
+              <a:ext uri="{28A0092B-C50C-407E-A947-70E740481C1C}">
+                <a14:useLocalDpi xmlns:a14="http://schemas.microsoft.com/office/drawing/2010/main" val="0"/>
+              </a:ext>
+            </a:extLst>
+          </a:blip>
+          <a:stretch>
+            <a:fillRect/>
+          </a:stretch>
+        </p:blipFill>
+        <p:spPr>
+          <a:xfrm>
+            <a:off x="6500672" y="4528933"/>
+            <a:ext cx="1662547" cy="1443180"/>
+          </a:xfrm>
+          <a:prstGeom prst="rect">
+            <a:avLst/>
+          </a:prstGeom>
+        </p:spPr>
+      </p:pic>
+      <p:sp>
+        <p:nvSpPr>
+          <p:cNvPr id="46" name="Arrow: Bent-Up 45">
+            <a:extLst>
+              <a:ext uri="{FF2B5EF4-FFF2-40B4-BE49-F238E27FC236}">
+                <a16:creationId xmlns:a16="http://schemas.microsoft.com/office/drawing/2014/main" id="{0AFCF58D-1351-447E-9FF5-F4043BF35E73}"/>
+              </a:ext>
+            </a:extLst>
+          </p:cNvPr>
+          <p:cNvSpPr/>
+          <p:nvPr/>
+        </p:nvSpPr>
+        <p:spPr>
+          <a:xfrm>
+            <a:off x="8520845" y="4177710"/>
+            <a:ext cx="1385212" cy="1277974"/>
+          </a:xfrm>
+          <a:prstGeom prst="bentUpArrow">
+            <a:avLst/>
+          </a:prstGeom>
+          <a:solidFill>
+            <a:schemeClr val="accent1">
+              <a:lumMod val="40000"/>
+              <a:lumOff val="60000"/>
+            </a:schemeClr>
+          </a:solidFill>
+        </p:spPr>
+        <p:style>
+          <a:lnRef idx="2">
+            <a:schemeClr val="accent1">
+              <a:shade val="50000"/>
+            </a:schemeClr>
+          </a:lnRef>
+          <a:fillRef idx="1">
+            <a:schemeClr val="accent1"/>
+          </a:fillRef>
+          <a:effectRef idx="0">
+            <a:schemeClr val="accent1"/>
+          </a:effectRef>
+          <a:fontRef idx="minor">
+            <a:schemeClr val="lt1"/>
+          </a:fontRef>
+        </p:style>
+        <p:txBody>
+          <a:bodyPr rtlCol="0" anchor="ctr"/>
+          <a:lstStyle/>
+          <a:p>
+            <a:pPr algn="ctr"/>
+            <a:endParaRPr lang="en-US"/>
+          </a:p>
+        </p:txBody>
+      </p:sp>
+      <p:sp>
+        <p:nvSpPr>
+          <p:cNvPr id="48" name="Arrow: Bent-Up 47">
+            <a:extLst>
+              <a:ext uri="{FF2B5EF4-FFF2-40B4-BE49-F238E27FC236}">
+                <a16:creationId xmlns:a16="http://schemas.microsoft.com/office/drawing/2014/main" id="{408D13B2-62E7-4A57-915D-E06C28C1D062}"/>
+              </a:ext>
+            </a:extLst>
+          </p:cNvPr>
+          <p:cNvSpPr/>
+          <p:nvPr/>
+        </p:nvSpPr>
+        <p:spPr>
+          <a:xfrm rot="16200000">
+            <a:off x="8463508" y="1455935"/>
+            <a:ext cx="1385212" cy="1277974"/>
+          </a:xfrm>
+          <a:prstGeom prst="bentUpArrow">
+            <a:avLst/>
+          </a:prstGeom>
+          <a:solidFill>
+            <a:schemeClr val="accent1">
+              <a:lumMod val="40000"/>
+              <a:lumOff val="60000"/>
+            </a:schemeClr>
+          </a:solidFill>
+        </p:spPr>
+        <p:style>
+          <a:lnRef idx="2">
+            <a:schemeClr val="accent1">
+              <a:shade val="50000"/>
+            </a:schemeClr>
+          </a:lnRef>
+          <a:fillRef idx="1">
+            <a:schemeClr val="accent1"/>
+          </a:fillRef>
+          <a:effectRef idx="0">
+            <a:schemeClr val="accent1"/>
+          </a:effectRef>
+          <a:fontRef idx="minor">
+            <a:schemeClr val="lt1"/>
+          </a:fontRef>
+        </p:style>
+        <p:txBody>
+          <a:bodyPr rtlCol="0" anchor="ctr"/>
+          <a:lstStyle/>
+          <a:p>
+            <a:pPr algn="ctr"/>
+            <a:endParaRPr lang="en-US" dirty="0"/>
+          </a:p>
+        </p:txBody>
+      </p:sp>
+      <p:sp>
+        <p:nvSpPr>
+          <p:cNvPr id="49" name="Arrow: Bent-Up 48">
+            <a:extLst>
+              <a:ext uri="{FF2B5EF4-FFF2-40B4-BE49-F238E27FC236}">
+                <a16:creationId xmlns:a16="http://schemas.microsoft.com/office/drawing/2014/main" id="{755BC460-900A-4D22-9637-D8840168B317}"/>
+              </a:ext>
+            </a:extLst>
+          </p:cNvPr>
+          <p:cNvSpPr/>
+          <p:nvPr/>
+        </p:nvSpPr>
+        <p:spPr>
+          <a:xfrm rot="10800000">
+            <a:off x="4819640" y="1528704"/>
+            <a:ext cx="1385212" cy="1277974"/>
+          </a:xfrm>
+          <a:prstGeom prst="bentUpArrow">
+            <a:avLst/>
+          </a:prstGeom>
+          <a:solidFill>
+            <a:schemeClr val="accent1">
+              <a:lumMod val="40000"/>
+              <a:lumOff val="60000"/>
+            </a:schemeClr>
+          </a:solidFill>
+        </p:spPr>
+        <p:style>
+          <a:lnRef idx="2">
+            <a:schemeClr val="accent1">
+              <a:shade val="50000"/>
+            </a:schemeClr>
+          </a:lnRef>
+          <a:fillRef idx="1">
+            <a:schemeClr val="accent1"/>
+          </a:fillRef>
+          <a:effectRef idx="0">
+            <a:schemeClr val="accent1"/>
+          </a:effectRef>
+          <a:fontRef idx="minor">
+            <a:schemeClr val="lt1"/>
+          </a:fontRef>
+        </p:style>
+        <p:txBody>
+          <a:bodyPr rtlCol="0" anchor="ctr"/>
+          <a:lstStyle/>
+          <a:p>
+            <a:pPr algn="ctr"/>
+            <a:endParaRPr lang="en-US" dirty="0"/>
+          </a:p>
+        </p:txBody>
+      </p:sp>
+      <p:sp>
+        <p:nvSpPr>
+          <p:cNvPr id="50" name="Arrow: Bent-Up 49">
+            <a:extLst>
+              <a:ext uri="{FF2B5EF4-FFF2-40B4-BE49-F238E27FC236}">
+                <a16:creationId xmlns:a16="http://schemas.microsoft.com/office/drawing/2014/main" id="{11785ED0-2AD8-4152-93ED-8775071830BE}"/>
+              </a:ext>
+            </a:extLst>
+          </p:cNvPr>
+          <p:cNvSpPr/>
+          <p:nvPr/>
+        </p:nvSpPr>
+        <p:spPr>
+          <a:xfrm rot="5400000">
+            <a:off x="4932215" y="4334756"/>
+            <a:ext cx="1385212" cy="1277974"/>
+          </a:xfrm>
+          <a:prstGeom prst="bentUpArrow">
+            <a:avLst/>
+          </a:prstGeom>
+          <a:solidFill>
+            <a:schemeClr val="accent1">
+              <a:lumMod val="40000"/>
+              <a:lumOff val="60000"/>
+            </a:schemeClr>
+          </a:solidFill>
+        </p:spPr>
+        <p:style>
+          <a:lnRef idx="2">
+            <a:schemeClr val="accent1">
+              <a:shade val="50000"/>
+            </a:schemeClr>
+          </a:lnRef>
+          <a:fillRef idx="1">
+            <a:schemeClr val="accent1"/>
+          </a:fillRef>
+          <a:effectRef idx="0">
+            <a:schemeClr val="accent1"/>
+          </a:effectRef>
+          <a:fontRef idx="minor">
+            <a:schemeClr val="lt1"/>
+          </a:fontRef>
+        </p:style>
+        <p:txBody>
+          <a:bodyPr rtlCol="0" anchor="ctr"/>
+          <a:lstStyle/>
+          <a:p>
+            <a:pPr algn="ctr"/>
+            <a:endParaRPr lang="en-US"/>
+          </a:p>
+        </p:txBody>
+      </p:sp>
+      <p:sp>
+        <p:nvSpPr>
+          <p:cNvPr id="53" name="Rectangle: Rounded Corners 52">
+            <a:extLst>
+              <a:ext uri="{FF2B5EF4-FFF2-40B4-BE49-F238E27FC236}">
+                <a16:creationId xmlns:a16="http://schemas.microsoft.com/office/drawing/2014/main" id="{A9395822-E443-46C4-96E8-8D32C8D45344}"/>
+              </a:ext>
+            </a:extLst>
+          </p:cNvPr>
+          <p:cNvSpPr/>
+          <p:nvPr/>
+        </p:nvSpPr>
+        <p:spPr>
+          <a:xfrm>
+            <a:off x="6500672" y="237074"/>
+            <a:ext cx="1662547" cy="879718"/>
+          </a:xfrm>
+          <a:prstGeom prst="roundRect">
+            <a:avLst/>
+          </a:prstGeom>
+        </p:spPr>
+        <p:style>
+          <a:lnRef idx="1">
+            <a:schemeClr val="accent1"/>
+          </a:lnRef>
+          <a:fillRef idx="2">
+            <a:schemeClr val="accent1"/>
+          </a:fillRef>
+          <a:effectRef idx="1">
+            <a:schemeClr val="accent1"/>
+          </a:effectRef>
+          <a:fontRef idx="minor">
+            <a:schemeClr val="dk1"/>
+          </a:fontRef>
+        </p:style>
+        <p:txBody>
+          <a:bodyPr rtlCol="0" anchor="ctr"/>
+          <a:lstStyle/>
+          <a:p>
+            <a:pPr algn="ctr"/>
+            <a:r>
+              <a:rPr lang="en-US" sz="1200" b="1" dirty="0">
+                <a:latin typeface="Arial" panose="020B0604020202020204" pitchFamily="34" charset="0"/>
+                <a:cs typeface="Arial" panose="020B0604020202020204" pitchFamily="34" charset="0"/>
+              </a:rPr>
+              <a:t>Computer</a:t>
+            </a:r>
+            <a:r>
+              <a:rPr lang="en-US" sz="1200" dirty="0">
+                <a:latin typeface="Arial" panose="020B0604020202020204" pitchFamily="34" charset="0"/>
+                <a:cs typeface="Arial" panose="020B0604020202020204" pitchFamily="34" charset="0"/>
+              </a:rPr>
+              <a:t> process input data from scanner </a:t>
+            </a:r>
+          </a:p>
+        </p:txBody>
+      </p:sp>
+      <p:sp>
+        <p:nvSpPr>
+          <p:cNvPr id="54" name="Rectangle 53">
+            <a:extLst>
+              <a:ext uri="{FF2B5EF4-FFF2-40B4-BE49-F238E27FC236}">
+                <a16:creationId xmlns:a16="http://schemas.microsoft.com/office/drawing/2014/main" id="{D0D6CA85-A1F9-4E0F-A621-4A2CB59AA0AC}"/>
+              </a:ext>
+            </a:extLst>
+          </p:cNvPr>
+          <p:cNvSpPr/>
+          <p:nvPr/>
+        </p:nvSpPr>
+        <p:spPr>
+          <a:xfrm>
+            <a:off x="0" y="0"/>
+            <a:ext cx="2728797" cy="6858000"/>
+          </a:xfrm>
+          <a:prstGeom prst="rect">
+            <a:avLst/>
+          </a:prstGeom>
+        </p:spPr>
+        <p:style>
+          <a:lnRef idx="2">
+            <a:schemeClr val="accent1">
+              <a:shade val="50000"/>
+            </a:schemeClr>
+          </a:lnRef>
+          <a:fillRef idx="1">
+            <a:schemeClr val="accent1"/>
+          </a:fillRef>
+          <a:effectRef idx="0">
+            <a:schemeClr val="accent1"/>
+          </a:effectRef>
+          <a:fontRef idx="minor">
+            <a:schemeClr val="lt1"/>
+          </a:fontRef>
+        </p:style>
+        <p:txBody>
+          <a:bodyPr rtlCol="0" anchor="ctr"/>
+          <a:lstStyle/>
+          <a:p>
+            <a:pPr algn="ctr"/>
+            <a:endParaRPr lang="en-US" sz="2000" b="1" dirty="0">
+              <a:solidFill>
+                <a:schemeClr val="tx1"/>
+              </a:solidFill>
+              <a:latin typeface="Arial" panose="020B0604020202020204" pitchFamily="34" charset="0"/>
+              <a:cs typeface="Arial" panose="020B0604020202020204" pitchFamily="34" charset="0"/>
+            </a:endParaRPr>
+          </a:p>
+        </p:txBody>
+      </p:sp>
+      <p:sp>
+        <p:nvSpPr>
+          <p:cNvPr id="56" name="Rectangle: Rounded Corners 55">
+            <a:extLst>
+              <a:ext uri="{FF2B5EF4-FFF2-40B4-BE49-F238E27FC236}">
+                <a16:creationId xmlns:a16="http://schemas.microsoft.com/office/drawing/2014/main" id="{D92ABA07-6D32-42D7-930D-C5D699D8DD1E}"/>
+              </a:ext>
+            </a:extLst>
+          </p:cNvPr>
+          <p:cNvSpPr/>
+          <p:nvPr/>
+        </p:nvSpPr>
+        <p:spPr>
+          <a:xfrm>
+            <a:off x="2821433" y="3077032"/>
+            <a:ext cx="1662547" cy="879718"/>
+          </a:xfrm>
+          <a:prstGeom prst="roundRect">
+            <a:avLst/>
+          </a:prstGeom>
+        </p:spPr>
+        <p:style>
+          <a:lnRef idx="1">
+            <a:schemeClr val="accent1"/>
+          </a:lnRef>
+          <a:fillRef idx="2">
+            <a:schemeClr val="accent1"/>
+          </a:fillRef>
+          <a:effectRef idx="1">
+            <a:schemeClr val="accent1"/>
+          </a:effectRef>
+          <a:fontRef idx="minor">
+            <a:schemeClr val="dk1"/>
+          </a:fontRef>
+        </p:style>
+        <p:txBody>
+          <a:bodyPr rtlCol="0" anchor="ctr"/>
+          <a:lstStyle/>
+          <a:p>
+            <a:pPr algn="ctr"/>
+            <a:r>
+              <a:rPr lang="en-US" sz="1400" b="1" dirty="0">
+                <a:latin typeface="Arial" panose="020B0604020202020204" pitchFamily="34" charset="0"/>
+                <a:cs typeface="Arial" panose="020B0604020202020204" pitchFamily="34" charset="0"/>
+              </a:rPr>
+              <a:t>Excel file </a:t>
+            </a:r>
+            <a:r>
+              <a:rPr lang="en-US" sz="1400" dirty="0">
+                <a:latin typeface="Arial" panose="020B0604020202020204" pitchFamily="34" charset="0"/>
+                <a:cs typeface="Arial" panose="020B0604020202020204" pitchFamily="34" charset="0"/>
+              </a:rPr>
+              <a:t>store and view data</a:t>
+            </a:r>
+          </a:p>
+        </p:txBody>
+      </p:sp>
+      <p:sp>
+        <p:nvSpPr>
+          <p:cNvPr id="57" name="Rectangle: Rounded Corners 56">
+            <a:extLst>
+              <a:ext uri="{FF2B5EF4-FFF2-40B4-BE49-F238E27FC236}">
+                <a16:creationId xmlns:a16="http://schemas.microsoft.com/office/drawing/2014/main" id="{508267B4-DB6E-4585-8845-877281AC0751}"/>
+              </a:ext>
+            </a:extLst>
+          </p:cNvPr>
+          <p:cNvSpPr/>
+          <p:nvPr/>
+        </p:nvSpPr>
+        <p:spPr>
+          <a:xfrm>
+            <a:off x="10353854" y="3104593"/>
+            <a:ext cx="1662547" cy="879718"/>
+          </a:xfrm>
+          <a:prstGeom prst="roundRect">
+            <a:avLst/>
+          </a:prstGeom>
+        </p:spPr>
+        <p:style>
+          <a:lnRef idx="1">
+            <a:schemeClr val="accent1"/>
+          </a:lnRef>
+          <a:fillRef idx="2">
+            <a:schemeClr val="accent1"/>
+          </a:fillRef>
+          <a:effectRef idx="1">
+            <a:schemeClr val="accent1"/>
+          </a:effectRef>
+          <a:fontRef idx="minor">
+            <a:schemeClr val="dk1"/>
+          </a:fontRef>
+        </p:style>
+        <p:txBody>
+          <a:bodyPr rtlCol="0" anchor="ctr"/>
+          <a:lstStyle/>
+          <a:p>
+            <a:pPr algn="ctr"/>
+            <a:r>
+              <a:rPr lang="en-US" sz="1400" b="1" dirty="0">
+                <a:latin typeface="Arial" panose="020B0604020202020204" pitchFamily="34" charset="0"/>
+                <a:cs typeface="Arial" panose="020B0604020202020204" pitchFamily="34" charset="0"/>
+              </a:rPr>
+              <a:t>Scanner </a:t>
+            </a:r>
+            <a:r>
+              <a:rPr lang="en-US" sz="1400" dirty="0">
+                <a:latin typeface="Arial" panose="020B0604020202020204" pitchFamily="34" charset="0"/>
+                <a:cs typeface="Arial" panose="020B0604020202020204" pitchFamily="34" charset="0"/>
+              </a:rPr>
+              <a:t>scans badges and sends the data to the computer</a:t>
+            </a:r>
+          </a:p>
+        </p:txBody>
+      </p:sp>
+      <p:sp>
+        <p:nvSpPr>
+          <p:cNvPr id="58" name="Rectangle: Rounded Corners 57">
+            <a:extLst>
+              <a:ext uri="{FF2B5EF4-FFF2-40B4-BE49-F238E27FC236}">
+                <a16:creationId xmlns:a16="http://schemas.microsoft.com/office/drawing/2014/main" id="{618B0F4B-4E2C-44FD-A400-FE71F2707CE2}"/>
+              </a:ext>
+            </a:extLst>
+          </p:cNvPr>
+          <p:cNvSpPr/>
+          <p:nvPr/>
+        </p:nvSpPr>
+        <p:spPr>
+          <a:xfrm>
+            <a:off x="6483801" y="5856661"/>
+            <a:ext cx="1662547" cy="879718"/>
+          </a:xfrm>
+          <a:prstGeom prst="roundRect">
+            <a:avLst/>
+          </a:prstGeom>
+        </p:spPr>
+        <p:style>
+          <a:lnRef idx="1">
+            <a:schemeClr val="accent1"/>
+          </a:lnRef>
+          <a:fillRef idx="2">
+            <a:schemeClr val="accent1"/>
+          </a:fillRef>
+          <a:effectRef idx="1">
+            <a:schemeClr val="accent1"/>
+          </a:effectRef>
+          <a:fontRef idx="minor">
+            <a:schemeClr val="dk1"/>
+          </a:fontRef>
+        </p:style>
+        <p:txBody>
+          <a:bodyPr rtlCol="0" anchor="ctr"/>
+          <a:lstStyle/>
+          <a:p>
+            <a:pPr algn="ctr"/>
+            <a:r>
+              <a:rPr lang="en-US" sz="1400" b="1" dirty="0">
+                <a:latin typeface="Arial" panose="020B0604020202020204" pitchFamily="34" charset="0"/>
+                <a:cs typeface="Arial" panose="020B0604020202020204" pitchFamily="34" charset="0"/>
+              </a:rPr>
+              <a:t>Student badge </a:t>
+            </a:r>
+            <a:r>
+              <a:rPr lang="en-US" sz="1400" dirty="0">
+                <a:latin typeface="Arial" panose="020B0604020202020204" pitchFamily="34" charset="0"/>
+                <a:cs typeface="Arial" panose="020B0604020202020204" pitchFamily="34" charset="0"/>
+              </a:rPr>
+              <a:t>used for the scan reader</a:t>
+            </a:r>
+          </a:p>
+        </p:txBody>
+      </p:sp>
+      <p:pic>
+        <p:nvPicPr>
+          <p:cNvPr id="60" name="Picture 59" descr="A close up of a logo&#10;&#10;Description automatically generated">
+            <a:extLst>
+              <a:ext uri="{FF2B5EF4-FFF2-40B4-BE49-F238E27FC236}">
+                <a16:creationId xmlns:a16="http://schemas.microsoft.com/office/drawing/2014/main" id="{387E8539-2F17-468C-86ED-57BD506249AA}"/>
+              </a:ext>
+            </a:extLst>
+          </p:cNvPr>
+          <p:cNvPicPr>
+            <a:picLocks noChangeAspect="1"/>
+          </p:cNvPicPr>
+          <p:nvPr/>
+        </p:nvPicPr>
+        <p:blipFill>
+          <a:blip r:embed="rId7">
+            <a:extLst>
+              <a:ext uri="{28A0092B-C50C-407E-A947-70E740481C1C}">
+                <a14:useLocalDpi xmlns:a14="http://schemas.microsoft.com/office/drawing/2010/main" val="0"/>
+              </a:ext>
+            </a:extLst>
+          </a:blip>
+          <a:stretch>
+            <a:fillRect/>
+          </a:stretch>
+        </p:blipFill>
+        <p:spPr>
+          <a:xfrm>
+            <a:off x="-39291" y="2684914"/>
+            <a:ext cx="2677430" cy="2678124"/>
+          </a:xfrm>
+          <a:prstGeom prst="rect">
+            <a:avLst/>
+          </a:prstGeom>
+        </p:spPr>
+      </p:pic>
+      <p:sp>
+        <p:nvSpPr>
+          <p:cNvPr id="62" name="TextBox 61">
+            <a:extLst>
+              <a:ext uri="{FF2B5EF4-FFF2-40B4-BE49-F238E27FC236}">
+                <a16:creationId xmlns:a16="http://schemas.microsoft.com/office/drawing/2014/main" id="{D5290E7E-5AB2-4368-A6D1-C3E3F1275384}"/>
+              </a:ext>
+            </a:extLst>
+          </p:cNvPr>
+          <p:cNvSpPr txBox="1"/>
+          <p:nvPr/>
+        </p:nvSpPr>
+        <p:spPr>
+          <a:xfrm>
+            <a:off x="-3" y="1522874"/>
+            <a:ext cx="2728797" cy="400110"/>
+          </a:xfrm>
+          <a:prstGeom prst="rect">
+            <a:avLst/>
+          </a:prstGeom>
+          <a:noFill/>
+        </p:spPr>
+        <p:txBody>
+          <a:bodyPr wrap="square" rtlCol="0">
+            <a:spAutoFit/>
+          </a:bodyPr>
+          <a:lstStyle/>
+          <a:p>
+            <a:pPr algn="ctr"/>
+            <a:r>
+              <a:rPr lang="en-US" sz="2000" b="1" dirty="0">
+                <a:latin typeface="Arial" panose="020B0604020202020204" pitchFamily="34" charset="0"/>
+                <a:cs typeface="Arial" panose="020B0604020202020204" pitchFamily="34" charset="0"/>
+              </a:rPr>
+              <a:t>SATS Components</a:t>
+            </a:r>
+          </a:p>
+        </p:txBody>
+      </p:sp>
+    </p:spTree>
+    <p:extLst>
+      <p:ext uri="{BB962C8B-B14F-4D97-AF65-F5344CB8AC3E}">
+        <p14:creationId xmlns:p14="http://schemas.microsoft.com/office/powerpoint/2010/main" val="3318936906"/>
+      </p:ext>
+    </p:extLst>
+  </p:cSld>
+  <p:clrMapOvr>
+    <a:masterClrMapping/>
+  </p:clrMapOvr>
+</p:sld>
+</file>
+
+<file path=ppt/slides/slide9.xml><?xml version="1.0" encoding="utf-8"?>
+<p:sld xmlns:a="http://schemas.openxmlformats.org/drawingml/2006/main" xmlns:r="http://schemas.openxmlformats.org/officeDocument/2006/relationships" xmlns:p="http://schemas.openxmlformats.org/presentationml/2006/main">
+  <p:cSld>
+    <p:spTree>
+      <p:nvGrpSpPr>
+        <p:cNvPr id="1" name=""/>
+        <p:cNvGrpSpPr/>
+        <p:nvPr/>
+      </p:nvGrpSpPr>
+      <p:grpSpPr>
+        <a:xfrm>
+          <a:off x="0" y="0"/>
+          <a:ext cx="0" cy="0"/>
+          <a:chOff x="0" y="0"/>
+          <a:chExt cx="0" cy="0"/>
+        </a:xfrm>
+      </p:grpSpPr>
+      <p:sp>
+        <p:nvSpPr>
+          <p:cNvPr id="8" name="Rectangle 7">
+            <a:extLst>
+              <a:ext uri="{FF2B5EF4-FFF2-40B4-BE49-F238E27FC236}">
+                <a16:creationId xmlns:a16="http://schemas.microsoft.com/office/drawing/2014/main" id="{CB3CA986-C31B-4906-8D2B-6E0ED7A5BD32}"/>
+              </a:ext>
+            </a:extLst>
+          </p:cNvPr>
+          <p:cNvSpPr/>
+          <p:nvPr/>
+        </p:nvSpPr>
+        <p:spPr>
+          <a:xfrm>
+            <a:off x="1" y="0"/>
+            <a:ext cx="3825380" cy="6858000"/>
+          </a:xfrm>
+          <a:prstGeom prst="rect">
+            <a:avLst/>
+          </a:prstGeom>
+        </p:spPr>
+        <p:style>
+          <a:lnRef idx="2">
+            <a:schemeClr val="accent1">
+              <a:shade val="50000"/>
+            </a:schemeClr>
+          </a:lnRef>
+          <a:fillRef idx="1">
+            <a:schemeClr val="accent1"/>
+          </a:fillRef>
+          <a:effectRef idx="0">
+            <a:schemeClr val="accent1"/>
+          </a:effectRef>
+          <a:fontRef idx="minor">
+            <a:schemeClr val="lt1"/>
+          </a:fontRef>
+        </p:style>
+        <p:txBody>
+          <a:bodyPr rtlCol="0" anchor="ctr"/>
+          <a:lstStyle/>
+          <a:p>
+            <a:pPr algn="ctr"/>
+            <a:endParaRPr lang="en-US"/>
+          </a:p>
+        </p:txBody>
+      </p:sp>
+      <p:pic>
+        <p:nvPicPr>
+          <p:cNvPr id="7" name="Picture 6" descr="A picture containing clock, plate&#10;&#10;Description automatically generated">
+            <a:extLst>
+              <a:ext uri="{FF2B5EF4-FFF2-40B4-BE49-F238E27FC236}">
+                <a16:creationId xmlns:a16="http://schemas.microsoft.com/office/drawing/2014/main" id="{6E1D7C95-B202-4A00-A6B9-90819AE16BF3}"/>
+              </a:ext>
+            </a:extLst>
+          </p:cNvPr>
+          <p:cNvPicPr>
+            <a:picLocks noChangeAspect="1"/>
+          </p:cNvPicPr>
+          <p:nvPr/>
+        </p:nvPicPr>
+        <p:blipFill>
+          <a:blip r:embed="rId2">
+            <a:extLst>
+              <a:ext uri="{28A0092B-C50C-407E-A947-70E740481C1C}">
+                <a14:useLocalDpi xmlns:a14="http://schemas.microsoft.com/office/drawing/2010/main" val="0"/>
+              </a:ext>
+            </a:extLst>
+          </a:blip>
+          <a:stretch>
+            <a:fillRect/>
+          </a:stretch>
+        </p:blipFill>
+        <p:spPr>
+          <a:xfrm>
+            <a:off x="280136" y="1736521"/>
+            <a:ext cx="3020935" cy="2099849"/>
+          </a:xfrm>
+          <a:prstGeom prst="rect">
+            <a:avLst/>
+          </a:prstGeom>
+        </p:spPr>
+      </p:pic>
+      <p:pic>
+        <p:nvPicPr>
+          <p:cNvPr id="5" name="Picture 4" descr="A picture containing comb, plate&#10;&#10;Description automatically generated">
+            <a:extLst>
+              <a:ext uri="{FF2B5EF4-FFF2-40B4-BE49-F238E27FC236}">
+                <a16:creationId xmlns:a16="http://schemas.microsoft.com/office/drawing/2014/main" id="{2C0F5D0D-ED8A-499C-8710-DF749BE9834E}"/>
+              </a:ext>
+            </a:extLst>
+          </p:cNvPr>
+          <p:cNvPicPr>
+            <a:picLocks noChangeAspect="1"/>
+          </p:cNvPicPr>
+          <p:nvPr/>
+        </p:nvPicPr>
+        <p:blipFill>
+          <a:blip r:embed="rId3">
+            <a:extLst>
+              <a:ext uri="{28A0092B-C50C-407E-A947-70E740481C1C}">
+                <a14:useLocalDpi xmlns:a14="http://schemas.microsoft.com/office/drawing/2010/main" val="0"/>
+              </a:ext>
+            </a:extLst>
+          </a:blip>
+          <a:stretch>
+            <a:fillRect/>
+          </a:stretch>
+        </p:blipFill>
+        <p:spPr>
+          <a:xfrm>
+            <a:off x="280135" y="4320834"/>
+            <a:ext cx="3020935" cy="2504114"/>
+          </a:xfrm>
+          <a:prstGeom prst="rect">
+            <a:avLst/>
+          </a:prstGeom>
+        </p:spPr>
+      </p:pic>
+      <p:sp>
+        <p:nvSpPr>
+          <p:cNvPr id="9" name="Rectangle 8">
+            <a:extLst>
+              <a:ext uri="{FF2B5EF4-FFF2-40B4-BE49-F238E27FC236}">
+                <a16:creationId xmlns:a16="http://schemas.microsoft.com/office/drawing/2014/main" id="{52F33B9B-EA66-4EDE-9FFC-12082DBF4E1B}"/>
+              </a:ext>
+            </a:extLst>
+          </p:cNvPr>
+          <p:cNvSpPr/>
+          <p:nvPr/>
+        </p:nvSpPr>
+        <p:spPr>
+          <a:xfrm>
+            <a:off x="3610564" y="-33052"/>
+            <a:ext cx="402670" cy="6891052"/>
+          </a:xfrm>
+          <a:prstGeom prst="rect">
+            <a:avLst/>
+          </a:prstGeom>
+          <a:solidFill>
+            <a:schemeClr val="tx1">
+              <a:lumMod val="75000"/>
+              <a:lumOff val="25000"/>
+            </a:schemeClr>
+          </a:solidFill>
+        </p:spPr>
+        <p:style>
+          <a:lnRef idx="2">
+            <a:schemeClr val="accent1">
+              <a:shade val="50000"/>
+            </a:schemeClr>
+          </a:lnRef>
+          <a:fillRef idx="1">
+            <a:schemeClr val="accent1"/>
+          </a:fillRef>
+          <a:effectRef idx="0">
+            <a:schemeClr val="accent1"/>
+          </a:effectRef>
+          <a:fontRef idx="minor">
+            <a:schemeClr val="lt1"/>
+          </a:fontRef>
+        </p:style>
+        <p:txBody>
+          <a:bodyPr rtlCol="0" anchor="ctr"/>
+          <a:lstStyle/>
+          <a:p>
+            <a:pPr algn="ctr"/>
+            <a:endParaRPr lang="en-US" dirty="0"/>
+          </a:p>
+        </p:txBody>
+      </p:sp>
+      <p:sp>
+        <p:nvSpPr>
+          <p:cNvPr id="12" name="Rectangle 11">
+            <a:extLst>
+              <a:ext uri="{FF2B5EF4-FFF2-40B4-BE49-F238E27FC236}">
+                <a16:creationId xmlns:a16="http://schemas.microsoft.com/office/drawing/2014/main" id="{F95031B9-9055-4A9C-942D-055DF92679A9}"/>
+              </a:ext>
+            </a:extLst>
+          </p:cNvPr>
+          <p:cNvSpPr/>
+          <p:nvPr/>
+        </p:nvSpPr>
+        <p:spPr>
+          <a:xfrm>
+            <a:off x="67112" y="302004"/>
+            <a:ext cx="3464653" cy="1040235"/>
+          </a:xfrm>
+          <a:prstGeom prst="rect">
+            <a:avLst/>
+          </a:prstGeom>
+          <a:solidFill>
+            <a:schemeClr val="accent1"/>
+          </a:solidFill>
+        </p:spPr>
+        <p:style>
+          <a:lnRef idx="2">
+            <a:schemeClr val="dk1"/>
+          </a:lnRef>
+          <a:fillRef idx="1">
+            <a:schemeClr val="lt1"/>
+          </a:fillRef>
+          <a:effectRef idx="0">
+            <a:schemeClr val="dk1"/>
+          </a:effectRef>
+          <a:fontRef idx="minor">
+            <a:schemeClr val="dk1"/>
+          </a:fontRef>
+        </p:style>
+        <p:txBody>
+          <a:bodyPr rtlCol="0" anchor="ctr"/>
+          <a:lstStyle/>
+          <a:p>
+            <a:pPr algn="ctr"/>
+            <a:r>
+              <a:rPr lang="en-US" sz="3600" b="1" dirty="0">
+                <a:latin typeface="Arial" panose="020B0604020202020204" pitchFamily="34" charset="0"/>
+                <a:cs typeface="Arial" panose="020B0604020202020204" pitchFamily="34" charset="0"/>
+              </a:rPr>
+              <a:t>Slides Content</a:t>
+            </a:r>
+          </a:p>
+        </p:txBody>
+      </p:sp>
+      <p:sp>
+        <p:nvSpPr>
+          <p:cNvPr id="13" name="Rectangle 12">
+            <a:extLst>
+              <a:ext uri="{FF2B5EF4-FFF2-40B4-BE49-F238E27FC236}">
+                <a16:creationId xmlns:a16="http://schemas.microsoft.com/office/drawing/2014/main" id="{175AF54C-E3C8-4EB4-8446-F73863014B40}"/>
+              </a:ext>
+            </a:extLst>
+          </p:cNvPr>
+          <p:cNvSpPr/>
+          <p:nvPr/>
+        </p:nvSpPr>
+        <p:spPr>
+          <a:xfrm>
+            <a:off x="4013234" y="0"/>
+            <a:ext cx="8178765" cy="6858000"/>
+          </a:xfrm>
+          <a:prstGeom prst="rect">
+            <a:avLst/>
+          </a:prstGeom>
+          <a:solidFill>
+            <a:schemeClr val="accent1">
+              <a:lumMod val="60000"/>
+              <a:lumOff val="40000"/>
+            </a:schemeClr>
+          </a:solidFill>
+        </p:spPr>
+        <p:style>
+          <a:lnRef idx="2">
+            <a:schemeClr val="accent1">
+              <a:shade val="50000"/>
+            </a:schemeClr>
+          </a:lnRef>
+          <a:fillRef idx="1">
+            <a:schemeClr val="accent1"/>
+          </a:fillRef>
+          <a:effectRef idx="0">
+            <a:schemeClr val="accent1"/>
+          </a:effectRef>
+          <a:fontRef idx="minor">
+            <a:schemeClr val="lt1"/>
+          </a:fontRef>
+        </p:style>
+        <p:txBody>
+          <a:bodyPr rtlCol="0" anchor="ctr"/>
+          <a:lstStyle/>
+          <a:p>
+            <a:pPr algn="ctr"/>
+            <a:endParaRPr lang="en-US" dirty="0"/>
+          </a:p>
+        </p:txBody>
+      </p:sp>
+      <p:sp>
+        <p:nvSpPr>
+          <p:cNvPr id="29" name="Rectangle: Rounded Corners 28">
+            <a:extLst>
+              <a:ext uri="{FF2B5EF4-FFF2-40B4-BE49-F238E27FC236}">
+                <a16:creationId xmlns:a16="http://schemas.microsoft.com/office/drawing/2014/main" id="{6A36487B-D9F4-46EB-B2A3-D12643142E68}"/>
+              </a:ext>
+            </a:extLst>
+          </p:cNvPr>
+          <p:cNvSpPr/>
+          <p:nvPr/>
+        </p:nvSpPr>
+        <p:spPr>
+          <a:xfrm>
+            <a:off x="4013234" y="381699"/>
+            <a:ext cx="7677725" cy="583036"/>
+          </a:xfrm>
+          <a:prstGeom prst="roundRect">
+            <a:avLst/>
+          </a:prstGeom>
+        </p:spPr>
+        <p:style>
+          <a:lnRef idx="2">
+            <a:schemeClr val="accent1">
+              <a:shade val="50000"/>
+            </a:schemeClr>
+          </a:lnRef>
+          <a:fillRef idx="1">
+            <a:schemeClr val="accent1"/>
+          </a:fillRef>
+          <a:effectRef idx="0">
+            <a:schemeClr val="accent1"/>
+          </a:effectRef>
+          <a:fontRef idx="minor">
+            <a:schemeClr val="lt1"/>
+          </a:fontRef>
+        </p:style>
+        <p:txBody>
+          <a:bodyPr rtlCol="0" anchor="ctr"/>
+          <a:lstStyle/>
+          <a:p>
+            <a:pPr algn="ctr"/>
+            <a:r>
+              <a:rPr lang="en-US" sz="2400" b="1" dirty="0">
+                <a:solidFill>
+                  <a:schemeClr val="tx1"/>
+                </a:solidFill>
+                <a:latin typeface="Arial" panose="020B0604020202020204" pitchFamily="34" charset="0"/>
+                <a:cs typeface="Arial" panose="020B0604020202020204" pitchFamily="34" charset="0"/>
+              </a:rPr>
+              <a:t>Introduction To SATS</a:t>
+            </a:r>
+          </a:p>
+        </p:txBody>
+      </p:sp>
+      <p:sp>
+        <p:nvSpPr>
+          <p:cNvPr id="20" name="Oval 19">
+            <a:extLst>
+              <a:ext uri="{FF2B5EF4-FFF2-40B4-BE49-F238E27FC236}">
+                <a16:creationId xmlns:a16="http://schemas.microsoft.com/office/drawing/2014/main" id="{04AA1731-12EF-4A04-8AC6-C99577549CEE}"/>
+              </a:ext>
+            </a:extLst>
+          </p:cNvPr>
+          <p:cNvSpPr/>
+          <p:nvPr/>
+        </p:nvSpPr>
+        <p:spPr>
+          <a:xfrm>
+            <a:off x="4092033" y="436226"/>
+            <a:ext cx="547082" cy="469783"/>
+          </a:xfrm>
+          <a:prstGeom prst="ellipse">
+            <a:avLst/>
+          </a:prstGeom>
+        </p:spPr>
+        <p:style>
+          <a:lnRef idx="2">
+            <a:schemeClr val="dk1"/>
+          </a:lnRef>
+          <a:fillRef idx="1">
+            <a:schemeClr val="lt1"/>
+          </a:fillRef>
+          <a:effectRef idx="0">
+            <a:schemeClr val="dk1"/>
+          </a:effectRef>
+          <a:fontRef idx="minor">
+            <a:schemeClr val="dk1"/>
+          </a:fontRef>
+        </p:style>
+        <p:txBody>
+          <a:bodyPr rtlCol="0" anchor="ctr"/>
+          <a:lstStyle/>
+          <a:p>
+            <a:pPr algn="ctr"/>
+            <a:r>
+              <a:rPr lang="en-US" sz="3200" b="1" dirty="0">
+                <a:latin typeface="Arial" panose="020B0604020202020204" pitchFamily="34" charset="0"/>
+                <a:cs typeface="Arial" panose="020B0604020202020204" pitchFamily="34" charset="0"/>
+              </a:rPr>
+              <a:t>1</a:t>
+            </a:r>
+          </a:p>
+        </p:txBody>
+      </p:sp>
+      <p:sp>
+        <p:nvSpPr>
+          <p:cNvPr id="30" name="Rectangle: Rounded Corners 29">
+            <a:extLst>
+              <a:ext uri="{FF2B5EF4-FFF2-40B4-BE49-F238E27FC236}">
+                <a16:creationId xmlns:a16="http://schemas.microsoft.com/office/drawing/2014/main" id="{199D13A5-D0F5-47DD-9A65-022E27FC8697}"/>
+              </a:ext>
+            </a:extLst>
+          </p:cNvPr>
+          <p:cNvSpPr/>
+          <p:nvPr/>
+        </p:nvSpPr>
+        <p:spPr>
+          <a:xfrm>
+            <a:off x="4013234" y="1206170"/>
+            <a:ext cx="7677725" cy="583036"/>
+          </a:xfrm>
+          <a:prstGeom prst="roundRect">
+            <a:avLst/>
+          </a:prstGeom>
+        </p:spPr>
+        <p:style>
+          <a:lnRef idx="2">
+            <a:schemeClr val="accent1">
+              <a:shade val="50000"/>
+            </a:schemeClr>
+          </a:lnRef>
+          <a:fillRef idx="1">
+            <a:schemeClr val="accent1"/>
+          </a:fillRef>
+          <a:effectRef idx="0">
+            <a:schemeClr val="accent1"/>
+          </a:effectRef>
+          <a:fontRef idx="minor">
+            <a:schemeClr val="lt1"/>
+          </a:fontRef>
+        </p:style>
+        <p:txBody>
+          <a:bodyPr rtlCol="0" anchor="ctr"/>
+          <a:lstStyle/>
+          <a:p>
+            <a:pPr algn="ctr"/>
+            <a:r>
+              <a:rPr lang="en-US" sz="2400" b="1" dirty="0">
+                <a:solidFill>
+                  <a:schemeClr val="tx1"/>
+                </a:solidFill>
+                <a:latin typeface="Arial" panose="020B0604020202020204" pitchFamily="34" charset="0"/>
+                <a:cs typeface="Arial" panose="020B0604020202020204" pitchFamily="34" charset="0"/>
+              </a:rPr>
+              <a:t>SATS Requirements </a:t>
+            </a:r>
+          </a:p>
+        </p:txBody>
+      </p:sp>
+      <p:sp>
+        <p:nvSpPr>
+          <p:cNvPr id="26" name="Oval 25">
+            <a:extLst>
+              <a:ext uri="{FF2B5EF4-FFF2-40B4-BE49-F238E27FC236}">
+                <a16:creationId xmlns:a16="http://schemas.microsoft.com/office/drawing/2014/main" id="{98264DA2-3EA7-4849-8A40-2D53787AB9AA}"/>
+              </a:ext>
+            </a:extLst>
+          </p:cNvPr>
+          <p:cNvSpPr/>
+          <p:nvPr/>
+        </p:nvSpPr>
+        <p:spPr>
+          <a:xfrm>
+            <a:off x="4105516" y="1266738"/>
+            <a:ext cx="547082" cy="469783"/>
+          </a:xfrm>
+          <a:prstGeom prst="ellipse">
+            <a:avLst/>
+          </a:prstGeom>
+        </p:spPr>
+        <p:style>
+          <a:lnRef idx="2">
+            <a:schemeClr val="dk1"/>
+          </a:lnRef>
+          <a:fillRef idx="1">
+            <a:schemeClr val="lt1"/>
+          </a:fillRef>
+          <a:effectRef idx="0">
+            <a:schemeClr val="dk1"/>
+          </a:effectRef>
+          <a:fontRef idx="minor">
+            <a:schemeClr val="dk1"/>
+          </a:fontRef>
+        </p:style>
+        <p:txBody>
+          <a:bodyPr rtlCol="0" anchor="ctr"/>
+          <a:lstStyle/>
+          <a:p>
+            <a:pPr algn="ctr"/>
+            <a:r>
+              <a:rPr lang="en-US" sz="3200" b="1" dirty="0">
+                <a:latin typeface="Arial" panose="020B0604020202020204" pitchFamily="34" charset="0"/>
+                <a:cs typeface="Arial" panose="020B0604020202020204" pitchFamily="34" charset="0"/>
+              </a:rPr>
+              <a:t>2</a:t>
+            </a:r>
+          </a:p>
+        </p:txBody>
+      </p:sp>
+      <p:sp>
+        <p:nvSpPr>
+          <p:cNvPr id="31" name="Rectangle: Rounded Corners 30">
+            <a:extLst>
+              <a:ext uri="{FF2B5EF4-FFF2-40B4-BE49-F238E27FC236}">
+                <a16:creationId xmlns:a16="http://schemas.microsoft.com/office/drawing/2014/main" id="{24866992-5A25-464E-B61C-579785BE618E}"/>
+              </a:ext>
+            </a:extLst>
+          </p:cNvPr>
+          <p:cNvSpPr/>
+          <p:nvPr/>
+        </p:nvSpPr>
+        <p:spPr>
+          <a:xfrm>
+            <a:off x="4013234" y="2037357"/>
+            <a:ext cx="7677725" cy="583036"/>
+          </a:xfrm>
+          <a:prstGeom prst="roundRect">
+            <a:avLst/>
+          </a:prstGeom>
+        </p:spPr>
+        <p:style>
+          <a:lnRef idx="2">
+            <a:schemeClr val="accent1">
+              <a:shade val="50000"/>
+            </a:schemeClr>
+          </a:lnRef>
+          <a:fillRef idx="1">
+            <a:schemeClr val="accent1"/>
+          </a:fillRef>
+          <a:effectRef idx="0">
+            <a:schemeClr val="accent1"/>
+          </a:effectRef>
+          <a:fontRef idx="minor">
+            <a:schemeClr val="lt1"/>
+          </a:fontRef>
+        </p:style>
+        <p:txBody>
+          <a:bodyPr rtlCol="0" anchor="ctr"/>
+          <a:lstStyle/>
+          <a:p>
+            <a:pPr algn="ctr"/>
+            <a:r>
+              <a:rPr lang="en-US" sz="2400" b="1" dirty="0">
+                <a:solidFill>
+                  <a:schemeClr val="tx1"/>
+                </a:solidFill>
+                <a:latin typeface="Arial" panose="020B0604020202020204" pitchFamily="34" charset="0"/>
+                <a:cs typeface="Arial" panose="020B0604020202020204" pitchFamily="34" charset="0"/>
+              </a:rPr>
+              <a:t>Introduction To SATS</a:t>
+            </a:r>
+          </a:p>
+        </p:txBody>
+      </p:sp>
+      <p:sp>
+        <p:nvSpPr>
+          <p:cNvPr id="23" name="Oval 22">
+            <a:extLst>
+              <a:ext uri="{FF2B5EF4-FFF2-40B4-BE49-F238E27FC236}">
+                <a16:creationId xmlns:a16="http://schemas.microsoft.com/office/drawing/2014/main" id="{87E32ED1-BDD1-4556-BE60-60AAA4054732}"/>
+              </a:ext>
+            </a:extLst>
+          </p:cNvPr>
+          <p:cNvSpPr/>
+          <p:nvPr/>
+        </p:nvSpPr>
+        <p:spPr>
+          <a:xfrm>
+            <a:off x="4092033" y="2097250"/>
+            <a:ext cx="547082" cy="469783"/>
+          </a:xfrm>
+          <a:prstGeom prst="ellipse">
+            <a:avLst/>
+          </a:prstGeom>
+        </p:spPr>
+        <p:style>
+          <a:lnRef idx="2">
+            <a:schemeClr val="dk1"/>
+          </a:lnRef>
+          <a:fillRef idx="1">
+            <a:schemeClr val="lt1"/>
+          </a:fillRef>
+          <a:effectRef idx="0">
+            <a:schemeClr val="dk1"/>
+          </a:effectRef>
+          <a:fontRef idx="minor">
+            <a:schemeClr val="dk1"/>
+          </a:fontRef>
+        </p:style>
+        <p:txBody>
+          <a:bodyPr rtlCol="0" anchor="ctr"/>
+          <a:lstStyle/>
+          <a:p>
+            <a:pPr algn="ctr"/>
+            <a:r>
+              <a:rPr lang="en-US" sz="3200" b="1" dirty="0">
+                <a:latin typeface="Arial" panose="020B0604020202020204" pitchFamily="34" charset="0"/>
+                <a:cs typeface="Arial" panose="020B0604020202020204" pitchFamily="34" charset="0"/>
+              </a:rPr>
+              <a:t>3</a:t>
+            </a:r>
+          </a:p>
+        </p:txBody>
+      </p:sp>
+      <p:sp>
+        <p:nvSpPr>
+          <p:cNvPr id="32" name="Rectangle: Rounded Corners 31">
+            <a:extLst>
+              <a:ext uri="{FF2B5EF4-FFF2-40B4-BE49-F238E27FC236}">
+                <a16:creationId xmlns:a16="http://schemas.microsoft.com/office/drawing/2014/main" id="{B2160D19-0DD2-4B53-A664-04F7A43C2596}"/>
+              </a:ext>
+            </a:extLst>
+          </p:cNvPr>
+          <p:cNvSpPr/>
+          <p:nvPr/>
+        </p:nvSpPr>
+        <p:spPr>
+          <a:xfrm>
+            <a:off x="4013234" y="2927087"/>
+            <a:ext cx="7677725" cy="583036"/>
+          </a:xfrm>
+          <a:prstGeom prst="roundRect">
+            <a:avLst/>
+          </a:prstGeom>
+        </p:spPr>
+        <p:style>
+          <a:lnRef idx="2">
+            <a:schemeClr val="accent1">
+              <a:shade val="50000"/>
+            </a:schemeClr>
+          </a:lnRef>
+          <a:fillRef idx="1">
+            <a:schemeClr val="accent1"/>
+          </a:fillRef>
+          <a:effectRef idx="0">
+            <a:schemeClr val="accent1"/>
+          </a:effectRef>
+          <a:fontRef idx="minor">
+            <a:schemeClr val="lt1"/>
+          </a:fontRef>
+        </p:style>
+        <p:txBody>
+          <a:bodyPr rtlCol="0" anchor="ctr"/>
+          <a:lstStyle/>
+          <a:p>
+            <a:pPr algn="ctr"/>
+            <a:r>
+              <a:rPr lang="en-US" sz="2400" b="1" dirty="0">
+                <a:solidFill>
+                  <a:schemeClr val="tx1"/>
+                </a:solidFill>
+                <a:latin typeface="Arial" panose="020B0604020202020204" pitchFamily="34" charset="0"/>
+                <a:cs typeface="Arial" panose="020B0604020202020204" pitchFamily="34" charset="0"/>
+              </a:rPr>
+              <a:t>Introduction To SATS</a:t>
+            </a:r>
+          </a:p>
+        </p:txBody>
+      </p:sp>
+      <p:sp>
+        <p:nvSpPr>
+          <p:cNvPr id="25" name="Oval 24">
+            <a:extLst>
+              <a:ext uri="{FF2B5EF4-FFF2-40B4-BE49-F238E27FC236}">
+                <a16:creationId xmlns:a16="http://schemas.microsoft.com/office/drawing/2014/main" id="{070DD079-C452-4889-B52C-C974F6372314}"/>
+              </a:ext>
+            </a:extLst>
+          </p:cNvPr>
+          <p:cNvSpPr/>
+          <p:nvPr/>
+        </p:nvSpPr>
+        <p:spPr>
+          <a:xfrm>
+            <a:off x="4105516" y="2944540"/>
+            <a:ext cx="547082" cy="469783"/>
+          </a:xfrm>
+          <a:prstGeom prst="ellipse">
+            <a:avLst/>
+          </a:prstGeom>
+        </p:spPr>
+        <p:style>
+          <a:lnRef idx="2">
+            <a:schemeClr val="dk1"/>
+          </a:lnRef>
+          <a:fillRef idx="1">
+            <a:schemeClr val="lt1"/>
+          </a:fillRef>
+          <a:effectRef idx="0">
+            <a:schemeClr val="dk1"/>
+          </a:effectRef>
+          <a:fontRef idx="minor">
+            <a:schemeClr val="dk1"/>
+          </a:fontRef>
+        </p:style>
+        <p:txBody>
+          <a:bodyPr rtlCol="0" anchor="ctr"/>
+          <a:lstStyle/>
+          <a:p>
+            <a:pPr algn="ctr"/>
+            <a:r>
+              <a:rPr lang="en-US" sz="3200" b="1" dirty="0">
+                <a:latin typeface="Arial" panose="020B0604020202020204" pitchFamily="34" charset="0"/>
+                <a:cs typeface="Arial" panose="020B0604020202020204" pitchFamily="34" charset="0"/>
+              </a:rPr>
+              <a:t>4</a:t>
+            </a:r>
+          </a:p>
+        </p:txBody>
+      </p:sp>
+      <p:sp>
+        <p:nvSpPr>
+          <p:cNvPr id="33" name="Rectangle: Rounded Corners 32">
+            <a:extLst>
+              <a:ext uri="{FF2B5EF4-FFF2-40B4-BE49-F238E27FC236}">
+                <a16:creationId xmlns:a16="http://schemas.microsoft.com/office/drawing/2014/main" id="{891006D7-EA72-4F71-B147-710197CB3583}"/>
+              </a:ext>
+            </a:extLst>
+          </p:cNvPr>
+          <p:cNvSpPr/>
+          <p:nvPr/>
+        </p:nvSpPr>
+        <p:spPr>
+          <a:xfrm>
+            <a:off x="4013233" y="3697706"/>
+            <a:ext cx="7677725" cy="583036"/>
+          </a:xfrm>
+          <a:prstGeom prst="roundRect">
+            <a:avLst/>
+          </a:prstGeom>
+        </p:spPr>
+        <p:style>
+          <a:lnRef idx="2">
+            <a:schemeClr val="accent1">
+              <a:shade val="50000"/>
+            </a:schemeClr>
+          </a:lnRef>
+          <a:fillRef idx="1">
+            <a:schemeClr val="accent1"/>
+          </a:fillRef>
+          <a:effectRef idx="0">
+            <a:schemeClr val="accent1"/>
+          </a:effectRef>
+          <a:fontRef idx="minor">
+            <a:schemeClr val="lt1"/>
+          </a:fontRef>
+        </p:style>
+        <p:txBody>
+          <a:bodyPr rtlCol="0" anchor="ctr"/>
+          <a:lstStyle/>
+          <a:p>
+            <a:pPr algn="ctr"/>
+            <a:r>
+              <a:rPr lang="en-US" sz="2400" b="1" dirty="0">
+                <a:solidFill>
+                  <a:schemeClr val="tx1"/>
+                </a:solidFill>
+                <a:latin typeface="Arial" panose="020B0604020202020204" pitchFamily="34" charset="0"/>
+                <a:cs typeface="Arial" panose="020B0604020202020204" pitchFamily="34" charset="0"/>
+              </a:rPr>
+              <a:t>Introduction To SATS</a:t>
+            </a:r>
+          </a:p>
+        </p:txBody>
+      </p:sp>
+      <p:sp>
+        <p:nvSpPr>
+          <p:cNvPr id="24" name="Oval 23">
+            <a:extLst>
+              <a:ext uri="{FF2B5EF4-FFF2-40B4-BE49-F238E27FC236}">
+                <a16:creationId xmlns:a16="http://schemas.microsoft.com/office/drawing/2014/main" id="{710F38CD-AB08-42AA-AFAC-ADF2C84B1C08}"/>
+              </a:ext>
+            </a:extLst>
+          </p:cNvPr>
+          <p:cNvSpPr/>
+          <p:nvPr/>
+        </p:nvSpPr>
+        <p:spPr>
+          <a:xfrm>
+            <a:off x="4134874" y="3758274"/>
+            <a:ext cx="547082" cy="469783"/>
+          </a:xfrm>
+          <a:prstGeom prst="ellipse">
+            <a:avLst/>
+          </a:prstGeom>
+        </p:spPr>
+        <p:style>
+          <a:lnRef idx="2">
+            <a:schemeClr val="dk1"/>
+          </a:lnRef>
+          <a:fillRef idx="1">
+            <a:schemeClr val="lt1"/>
+          </a:fillRef>
+          <a:effectRef idx="0">
+            <a:schemeClr val="dk1"/>
+          </a:effectRef>
+          <a:fontRef idx="minor">
+            <a:schemeClr val="dk1"/>
+          </a:fontRef>
+        </p:style>
+        <p:txBody>
+          <a:bodyPr rtlCol="0" anchor="ctr"/>
+          <a:lstStyle/>
+          <a:p>
+            <a:pPr algn="ctr"/>
+            <a:r>
+              <a:rPr lang="en-US" sz="3200" b="1" dirty="0">
+                <a:latin typeface="Arial" panose="020B0604020202020204" pitchFamily="34" charset="0"/>
+                <a:cs typeface="Arial" panose="020B0604020202020204" pitchFamily="34" charset="0"/>
+              </a:rPr>
+              <a:t>5</a:t>
+            </a:r>
+          </a:p>
+        </p:txBody>
+      </p:sp>
+      <p:sp>
+        <p:nvSpPr>
+          <p:cNvPr id="34" name="Rectangle: Rounded Corners 33">
+            <a:extLst>
+              <a:ext uri="{FF2B5EF4-FFF2-40B4-BE49-F238E27FC236}">
+                <a16:creationId xmlns:a16="http://schemas.microsoft.com/office/drawing/2014/main" id="{9FDCC7E9-0182-48FD-91E0-F9528CBC45D3}"/>
+              </a:ext>
+            </a:extLst>
+          </p:cNvPr>
+          <p:cNvSpPr/>
+          <p:nvPr/>
+        </p:nvSpPr>
+        <p:spPr>
+          <a:xfrm>
+            <a:off x="4013233" y="4532159"/>
+            <a:ext cx="7677725" cy="583036"/>
+          </a:xfrm>
+          <a:prstGeom prst="roundRect">
+            <a:avLst/>
+          </a:prstGeom>
+        </p:spPr>
+        <p:style>
+          <a:lnRef idx="2">
+            <a:schemeClr val="accent1">
+              <a:shade val="50000"/>
+            </a:schemeClr>
+          </a:lnRef>
+          <a:fillRef idx="1">
+            <a:schemeClr val="accent1"/>
+          </a:fillRef>
+          <a:effectRef idx="0">
+            <a:schemeClr val="accent1"/>
+          </a:effectRef>
+          <a:fontRef idx="minor">
+            <a:schemeClr val="lt1"/>
+          </a:fontRef>
+        </p:style>
+        <p:txBody>
+          <a:bodyPr rtlCol="0" anchor="ctr"/>
+          <a:lstStyle/>
+          <a:p>
+            <a:pPr algn="ctr"/>
+            <a:r>
+              <a:rPr lang="en-US" sz="2400" b="1" dirty="0">
+                <a:solidFill>
+                  <a:schemeClr val="tx1"/>
+                </a:solidFill>
+                <a:latin typeface="Arial" panose="020B0604020202020204" pitchFamily="34" charset="0"/>
+                <a:cs typeface="Arial" panose="020B0604020202020204" pitchFamily="34" charset="0"/>
+              </a:rPr>
+              <a:t>Introduction To SATS</a:t>
+            </a:r>
+          </a:p>
+        </p:txBody>
+      </p:sp>
+      <p:sp>
+        <p:nvSpPr>
+          <p:cNvPr id="22" name="Oval 21">
+            <a:extLst>
+              <a:ext uri="{FF2B5EF4-FFF2-40B4-BE49-F238E27FC236}">
+                <a16:creationId xmlns:a16="http://schemas.microsoft.com/office/drawing/2014/main" id="{DF469DCE-1D47-428C-B082-4E57A24682E8}"/>
+              </a:ext>
+            </a:extLst>
+          </p:cNvPr>
+          <p:cNvSpPr/>
+          <p:nvPr/>
+        </p:nvSpPr>
+        <p:spPr>
+          <a:xfrm>
+            <a:off x="4139570" y="4588786"/>
+            <a:ext cx="547082" cy="469783"/>
+          </a:xfrm>
+          <a:prstGeom prst="ellipse">
+            <a:avLst/>
+          </a:prstGeom>
+        </p:spPr>
+        <p:style>
+          <a:lnRef idx="2">
+            <a:schemeClr val="dk1"/>
+          </a:lnRef>
+          <a:fillRef idx="1">
+            <a:schemeClr val="lt1"/>
+          </a:fillRef>
+          <a:effectRef idx="0">
+            <a:schemeClr val="dk1"/>
+          </a:effectRef>
+          <a:fontRef idx="minor">
+            <a:schemeClr val="dk1"/>
+          </a:fontRef>
+        </p:style>
+        <p:txBody>
+          <a:bodyPr rtlCol="0" anchor="ctr"/>
+          <a:lstStyle/>
+          <a:p>
+            <a:pPr algn="ctr"/>
+            <a:r>
+              <a:rPr lang="en-US" sz="3200" b="1" dirty="0">
+                <a:latin typeface="Arial" panose="020B0604020202020204" pitchFamily="34" charset="0"/>
+                <a:cs typeface="Arial" panose="020B0604020202020204" pitchFamily="34" charset="0"/>
+              </a:rPr>
+              <a:t>6</a:t>
+            </a:r>
+          </a:p>
+        </p:txBody>
+      </p:sp>
+      <p:pic>
+        <p:nvPicPr>
+          <p:cNvPr id="28" name="Picture 27" descr="A picture containing drawing&#10;&#10;Description automatically generated">
+            <a:extLst>
+              <a:ext uri="{FF2B5EF4-FFF2-40B4-BE49-F238E27FC236}">
+                <a16:creationId xmlns:a16="http://schemas.microsoft.com/office/drawing/2014/main" id="{B1FB34BB-937E-4ACB-9CCB-DD01B0A76610}"/>
+              </a:ext>
+            </a:extLst>
+          </p:cNvPr>
+          <p:cNvPicPr>
+            <a:picLocks noChangeAspect="1"/>
+          </p:cNvPicPr>
+          <p:nvPr/>
+        </p:nvPicPr>
+        <p:blipFill>
+          <a:blip r:embed="rId4">
+            <a:extLst>
+              <a:ext uri="{28A0092B-C50C-407E-A947-70E740481C1C}">
+                <a14:useLocalDpi xmlns:a14="http://schemas.microsoft.com/office/drawing/2010/main" val="0"/>
+              </a:ext>
+            </a:extLst>
+          </a:blip>
+          <a:stretch>
+            <a:fillRect/>
+          </a:stretch>
+        </p:blipFill>
+        <p:spPr>
+          <a:xfrm>
+            <a:off x="11022887" y="1228068"/>
+            <a:ext cx="612395" cy="528509"/>
+          </a:xfrm>
+          <a:prstGeom prst="rect">
+            <a:avLst/>
+          </a:prstGeom>
+        </p:spPr>
+      </p:pic>
+    </p:spTree>
+    <p:extLst>
+      <p:ext uri="{BB962C8B-B14F-4D97-AF65-F5344CB8AC3E}">
+        <p14:creationId xmlns:p14="http://schemas.microsoft.com/office/powerpoint/2010/main" val="4237941569"/>
       </p:ext>
     </p:extLst>
   </p:cSld>

</xml_diff>